<commit_message>
adding images for read me
</commit_message>
<xml_diff>
--- a/data2/capstone_presentation.pptx
+++ b/data2/capstone_presentation.pptx
@@ -213,7 +213,7 @@
           <a:p>
             <a:fld id="{4E0A4765-145A-4C54-8C5D-08BFBEB24F1E}" type="datetimeFigureOut">
               <a:rPr lang="en-US" smtClean="0"/>
-              <a:t>6/22/2021</a:t>
+              <a:t>6/24/2021</a:t>
             </a:fld>
             <a:endParaRPr lang="en-US"/>
           </a:p>
@@ -1202,7 +1202,7 @@
           <a:p>
             <a:fld id="{8815741F-B213-444A-8B9F-55206AE901B6}" type="datetimeFigureOut">
               <a:rPr lang="en-US" smtClean="0"/>
-              <a:t>6/22/2021</a:t>
+              <a:t>6/24/2021</a:t>
             </a:fld>
             <a:endParaRPr lang="en-US"/>
           </a:p>
@@ -1453,7 +1453,7 @@
           <a:p>
             <a:fld id="{8815741F-B213-444A-8B9F-55206AE901B6}" type="datetimeFigureOut">
               <a:rPr lang="en-US" smtClean="0"/>
-              <a:t>6/22/2021</a:t>
+              <a:t>6/24/2021</a:t>
             </a:fld>
             <a:endParaRPr lang="en-US"/>
           </a:p>
@@ -1767,7 +1767,7 @@
           <a:p>
             <a:fld id="{8815741F-B213-444A-8B9F-55206AE901B6}" type="datetimeFigureOut">
               <a:rPr lang="en-US" smtClean="0"/>
-              <a:t>6/22/2021</a:t>
+              <a:t>6/24/2021</a:t>
             </a:fld>
             <a:endParaRPr lang="en-US"/>
           </a:p>
@@ -2108,7 +2108,7 @@
           <a:p>
             <a:fld id="{8815741F-B213-444A-8B9F-55206AE901B6}" type="datetimeFigureOut">
               <a:rPr lang="en-US" smtClean="0"/>
-              <a:t>6/22/2021</a:t>
+              <a:t>6/24/2021</a:t>
             </a:fld>
             <a:endParaRPr lang="en-US"/>
           </a:p>
@@ -2422,7 +2422,7 @@
           <a:p>
             <a:fld id="{8815741F-B213-444A-8B9F-55206AE901B6}" type="datetimeFigureOut">
               <a:rPr lang="en-US" smtClean="0"/>
-              <a:t>6/22/2021</a:t>
+              <a:t>6/24/2021</a:t>
             </a:fld>
             <a:endParaRPr lang="en-US"/>
           </a:p>
@@ -2815,7 +2815,7 @@
           <a:p>
             <a:fld id="{8815741F-B213-444A-8B9F-55206AE901B6}" type="datetimeFigureOut">
               <a:rPr lang="en-US" smtClean="0"/>
-              <a:t>6/22/2021</a:t>
+              <a:t>6/24/2021</a:t>
             </a:fld>
             <a:endParaRPr lang="en-US"/>
           </a:p>
@@ -2985,7 +2985,7 @@
           <a:p>
             <a:fld id="{8815741F-B213-444A-8B9F-55206AE901B6}" type="datetimeFigureOut">
               <a:rPr lang="en-US" smtClean="0"/>
-              <a:t>6/22/2021</a:t>
+              <a:t>6/24/2021</a:t>
             </a:fld>
             <a:endParaRPr lang="en-US"/>
           </a:p>
@@ -3165,7 +3165,7 @@
           <a:p>
             <a:fld id="{8815741F-B213-444A-8B9F-55206AE901B6}" type="datetimeFigureOut">
               <a:rPr lang="en-US" smtClean="0"/>
-              <a:t>6/22/2021</a:t>
+              <a:t>6/24/2021</a:t>
             </a:fld>
             <a:endParaRPr lang="en-US"/>
           </a:p>
@@ -3341,7 +3341,7 @@
           <a:p>
             <a:fld id="{8815741F-B213-444A-8B9F-55206AE901B6}" type="datetimeFigureOut">
               <a:rPr lang="en-US" smtClean="0"/>
-              <a:t>6/22/2021</a:t>
+              <a:t>6/24/2021</a:t>
             </a:fld>
             <a:endParaRPr lang="en-US"/>
           </a:p>
@@ -3588,7 +3588,7 @@
           <a:p>
             <a:fld id="{8815741F-B213-444A-8B9F-55206AE901B6}" type="datetimeFigureOut">
               <a:rPr lang="en-US" smtClean="0"/>
-              <a:t>6/22/2021</a:t>
+              <a:t>6/24/2021</a:t>
             </a:fld>
             <a:endParaRPr lang="en-US"/>
           </a:p>
@@ -3820,7 +3820,7 @@
           <a:p>
             <a:fld id="{8815741F-B213-444A-8B9F-55206AE901B6}" type="datetimeFigureOut">
               <a:rPr lang="en-US" smtClean="0"/>
-              <a:t>6/22/2021</a:t>
+              <a:t>6/24/2021</a:t>
             </a:fld>
             <a:endParaRPr lang="en-US"/>
           </a:p>
@@ -4194,7 +4194,7 @@
           <a:p>
             <a:fld id="{8815741F-B213-444A-8B9F-55206AE901B6}" type="datetimeFigureOut">
               <a:rPr lang="en-US" smtClean="0"/>
-              <a:t>6/22/2021</a:t>
+              <a:t>6/24/2021</a:t>
             </a:fld>
             <a:endParaRPr lang="en-US"/>
           </a:p>
@@ -4317,7 +4317,7 @@
           <a:p>
             <a:fld id="{8815741F-B213-444A-8B9F-55206AE901B6}" type="datetimeFigureOut">
               <a:rPr lang="en-US" smtClean="0"/>
-              <a:t>6/22/2021</a:t>
+              <a:t>6/24/2021</a:t>
             </a:fld>
             <a:endParaRPr lang="en-US"/>
           </a:p>
@@ -4412,7 +4412,7 @@
           <a:p>
             <a:fld id="{8815741F-B213-444A-8B9F-55206AE901B6}" type="datetimeFigureOut">
               <a:rPr lang="en-US" smtClean="0"/>
-              <a:t>6/22/2021</a:t>
+              <a:t>6/24/2021</a:t>
             </a:fld>
             <a:endParaRPr lang="en-US"/>
           </a:p>
@@ -4667,7 +4667,7 @@
           <a:p>
             <a:fld id="{8815741F-B213-444A-8B9F-55206AE901B6}" type="datetimeFigureOut">
               <a:rPr lang="en-US" smtClean="0"/>
-              <a:t>6/22/2021</a:t>
+              <a:t>6/24/2021</a:t>
             </a:fld>
             <a:endParaRPr lang="en-US"/>
           </a:p>
@@ -4930,7 +4930,7 @@
           <a:p>
             <a:fld id="{8815741F-B213-444A-8B9F-55206AE901B6}" type="datetimeFigureOut">
               <a:rPr lang="en-US" smtClean="0"/>
-              <a:t>6/22/2021</a:t>
+              <a:t>6/24/2021</a:t>
             </a:fld>
             <a:endParaRPr lang="en-US"/>
           </a:p>
@@ -5673,7 +5673,7 @@
           <a:p>
             <a:fld id="{8815741F-B213-444A-8B9F-55206AE901B6}" type="datetimeFigureOut">
               <a:rPr lang="en-US" smtClean="0"/>
-              <a:t>6/22/2021</a:t>
+              <a:t>6/24/2021</a:t>
             </a:fld>
             <a:endParaRPr lang="en-US"/>
           </a:p>
@@ -7770,7 +7770,7 @@
       </p:grpSpPr>
       <p:grpSp>
         <p:nvGrpSpPr>
-          <p:cNvPr id="71" name="Group 70">
+          <p:cNvPr id="135" name="Group 134">
             <a:extLst>
               <a:ext uri="{FF2B5EF4-FFF2-40B4-BE49-F238E27FC236}">
                 <a16:creationId xmlns:a16="http://schemas.microsoft.com/office/drawing/2014/main" id="{609316A9-990D-4EC3-A671-70EE5C1493A4}"/>
@@ -7801,7 +7801,7 @@
         </p:grpSpPr>
         <p:cxnSp>
           <p:nvCxnSpPr>
-            <p:cNvPr id="72" name="Straight Connector 71">
+            <p:cNvPr id="136" name="Straight Connector 135">
               <a:extLst>
                 <a:ext uri="{FF2B5EF4-FFF2-40B4-BE49-F238E27FC236}">
                   <a16:creationId xmlns:a16="http://schemas.microsoft.com/office/drawing/2014/main" id="{9B0C6109-9159-49CA-AD7A-F9035539DB7F}"/>
@@ -7853,7 +7853,7 @@
         </p:cxnSp>
         <p:cxnSp>
           <p:nvCxnSpPr>
-            <p:cNvPr id="73" name="Straight Connector 72">
+            <p:cNvPr id="137" name="Straight Connector 136">
               <a:extLst>
                 <a:ext uri="{FF2B5EF4-FFF2-40B4-BE49-F238E27FC236}">
                   <a16:creationId xmlns:a16="http://schemas.microsoft.com/office/drawing/2014/main" id="{686F14F5-308C-4EB6-87AB-05DE9501B1AA}"/>
@@ -7905,7 +7905,7 @@
         </p:cxnSp>
         <p:sp>
           <p:nvSpPr>
-            <p:cNvPr id="74" name="Rectangle 23">
+            <p:cNvPr id="138" name="Rectangle 23">
               <a:extLst>
                 <a:ext uri="{FF2B5EF4-FFF2-40B4-BE49-F238E27FC236}">
                   <a16:creationId xmlns:a16="http://schemas.microsoft.com/office/drawing/2014/main" id="{BA032363-A188-47C5-9D59-9B788809DCD2}"/>
@@ -7983,7 +7983,7 @@
         </p:sp>
         <p:sp>
           <p:nvSpPr>
-            <p:cNvPr id="75" name="Rectangle 25">
+            <p:cNvPr id="139" name="Rectangle 25">
               <a:extLst>
                 <a:ext uri="{FF2B5EF4-FFF2-40B4-BE49-F238E27FC236}">
                   <a16:creationId xmlns:a16="http://schemas.microsoft.com/office/drawing/2014/main" id="{2C4077DF-6BB9-4069-AD28-6B1664EBB064}"/>
@@ -8061,7 +8061,7 @@
         </p:sp>
         <p:sp>
           <p:nvSpPr>
-            <p:cNvPr id="76" name="Isosceles Triangle 75">
+            <p:cNvPr id="140" name="Isosceles Triangle 139">
               <a:extLst>
                 <a:ext uri="{FF2B5EF4-FFF2-40B4-BE49-F238E27FC236}">
                   <a16:creationId xmlns:a16="http://schemas.microsoft.com/office/drawing/2014/main" id="{1D2B8B50-3419-41ED-9A9F-3CF9EEBBD3F2}"/>
@@ -8117,7 +8117,7 @@
         </p:sp>
         <p:sp>
           <p:nvSpPr>
-            <p:cNvPr id="77" name="Rectangle 27">
+            <p:cNvPr id="141" name="Rectangle 27">
               <a:extLst>
                 <a:ext uri="{FF2B5EF4-FFF2-40B4-BE49-F238E27FC236}">
                   <a16:creationId xmlns:a16="http://schemas.microsoft.com/office/drawing/2014/main" id="{5C640498-2E73-4FA2-BEB6-C3596A458C8A}"/>
@@ -8196,7 +8196,7 @@
         </p:sp>
         <p:sp>
           <p:nvSpPr>
-            <p:cNvPr id="78" name="Rectangle 28">
+            <p:cNvPr id="142" name="Rectangle 28">
               <a:extLst>
                 <a:ext uri="{FF2B5EF4-FFF2-40B4-BE49-F238E27FC236}">
                   <a16:creationId xmlns:a16="http://schemas.microsoft.com/office/drawing/2014/main" id="{3240EEFC-4112-4C39-A816-C815774F6D69}"/>
@@ -8276,7 +8276,7 @@
         </p:sp>
         <p:sp>
           <p:nvSpPr>
-            <p:cNvPr id="79" name="Rectangle 29">
+            <p:cNvPr id="143" name="Rectangle 29">
               <a:extLst>
                 <a:ext uri="{FF2B5EF4-FFF2-40B4-BE49-F238E27FC236}">
                   <a16:creationId xmlns:a16="http://schemas.microsoft.com/office/drawing/2014/main" id="{ADF362B0-03EA-4800-9FAA-9F128587E428}"/>
@@ -8354,7 +8354,7 @@
         </p:sp>
         <p:sp>
           <p:nvSpPr>
-            <p:cNvPr id="80" name="Isosceles Triangle 79">
+            <p:cNvPr id="144" name="Isosceles Triangle 143">
               <a:extLst>
                 <a:ext uri="{FF2B5EF4-FFF2-40B4-BE49-F238E27FC236}">
                   <a16:creationId xmlns:a16="http://schemas.microsoft.com/office/drawing/2014/main" id="{0BA84559-2F4C-4795-9246-4C563F942DB9}"/>
@@ -8410,7 +8410,7 @@
         </p:sp>
         <p:sp>
           <p:nvSpPr>
-            <p:cNvPr id="81" name="Isosceles Triangle 80">
+            <p:cNvPr id="145" name="Isosceles Triangle 144">
               <a:extLst>
                 <a:ext uri="{FF2B5EF4-FFF2-40B4-BE49-F238E27FC236}">
                   <a16:creationId xmlns:a16="http://schemas.microsoft.com/office/drawing/2014/main" id="{FA77A1AA-CA47-4A91-A0A1-0A8CE31A985E}"/>
@@ -8467,7 +8467,7 @@
       </p:grpSp>
       <p:sp>
         <p:nvSpPr>
-          <p:cNvPr id="83" name="Rectangle 82">
+          <p:cNvPr id="147" name="Rectangle 146">
             <a:extLst>
               <a:ext uri="{FF2B5EF4-FFF2-40B4-BE49-F238E27FC236}">
                 <a16:creationId xmlns:a16="http://schemas.microsoft.com/office/drawing/2014/main" id="{03E8462A-FEBA-4848-81CC-3F8DA3E477BE}"/>
@@ -8530,7 +8530,7 @@
       </p:sp>
       <p:grpSp>
         <p:nvGrpSpPr>
-          <p:cNvPr id="85" name="Group 84">
+          <p:cNvPr id="149" name="Group 148">
             <a:extLst>
               <a:ext uri="{FF2B5EF4-FFF2-40B4-BE49-F238E27FC236}">
                 <a16:creationId xmlns:a16="http://schemas.microsoft.com/office/drawing/2014/main" id="{2109F83F-40FE-4DB3-84CC-09FB3340D06D}"/>
@@ -8561,7 +8561,7 @@
         </p:grpSpPr>
         <p:cxnSp>
           <p:nvCxnSpPr>
-            <p:cNvPr id="86" name="Straight Connector 85">
+            <p:cNvPr id="150" name="Straight Connector 149">
               <a:extLst>
                 <a:ext uri="{FF2B5EF4-FFF2-40B4-BE49-F238E27FC236}">
                   <a16:creationId xmlns:a16="http://schemas.microsoft.com/office/drawing/2014/main" id="{1DE492D7-C3C3-48FF-80C8-37021EA0262F}"/>
@@ -8613,7 +8613,7 @@
         </p:cxnSp>
         <p:sp>
           <p:nvSpPr>
-            <p:cNvPr id="87" name="Rectangle 23">
+            <p:cNvPr id="151" name="Rectangle 23">
               <a:extLst>
                 <a:ext uri="{FF2B5EF4-FFF2-40B4-BE49-F238E27FC236}">
                   <a16:creationId xmlns:a16="http://schemas.microsoft.com/office/drawing/2014/main" id="{0B30FF97-2E9A-490A-AED2-90BA2E0EC17F}"/>
@@ -8691,7 +8691,7 @@
         </p:sp>
         <p:sp>
           <p:nvSpPr>
-            <p:cNvPr id="88" name="Rectangle 25">
+            <p:cNvPr id="152" name="Rectangle 25">
               <a:extLst>
                 <a:ext uri="{FF2B5EF4-FFF2-40B4-BE49-F238E27FC236}">
                   <a16:creationId xmlns:a16="http://schemas.microsoft.com/office/drawing/2014/main" id="{B6D53C7D-A312-47B6-A66A-230A19CFACA6}"/>
@@ -8769,7 +8769,7 @@
         </p:sp>
         <p:sp>
           <p:nvSpPr>
-            <p:cNvPr id="89" name="Isosceles Triangle 88">
+            <p:cNvPr id="153" name="Isosceles Triangle 152">
               <a:extLst>
                 <a:ext uri="{FF2B5EF4-FFF2-40B4-BE49-F238E27FC236}">
                   <a16:creationId xmlns:a16="http://schemas.microsoft.com/office/drawing/2014/main" id="{9329D58C-0D2E-4A2B-AD6A-9CEE506784A8}"/>
@@ -8825,7 +8825,7 @@
         </p:sp>
         <p:sp>
           <p:nvSpPr>
-            <p:cNvPr id="90" name="Rectangle 27">
+            <p:cNvPr id="154" name="Rectangle 27">
               <a:extLst>
                 <a:ext uri="{FF2B5EF4-FFF2-40B4-BE49-F238E27FC236}">
                   <a16:creationId xmlns:a16="http://schemas.microsoft.com/office/drawing/2014/main" id="{9D446EDE-C690-4461-8BF2-7634808FC8B4}"/>
@@ -8904,7 +8904,7 @@
         </p:sp>
         <p:sp>
           <p:nvSpPr>
-            <p:cNvPr id="91" name="Rectangle 28">
+            <p:cNvPr id="155" name="Rectangle 28">
               <a:extLst>
                 <a:ext uri="{FF2B5EF4-FFF2-40B4-BE49-F238E27FC236}">
                   <a16:creationId xmlns:a16="http://schemas.microsoft.com/office/drawing/2014/main" id="{323F3D34-6531-4AD7-A8C6-195A090281A1}"/>
@@ -8984,7 +8984,7 @@
         </p:sp>
         <p:sp>
           <p:nvSpPr>
-            <p:cNvPr id="92" name="Rectangle 29">
+            <p:cNvPr id="156" name="Rectangle 29">
               <a:extLst>
                 <a:ext uri="{FF2B5EF4-FFF2-40B4-BE49-F238E27FC236}">
                   <a16:creationId xmlns:a16="http://schemas.microsoft.com/office/drawing/2014/main" id="{B9B0AE3F-2350-435F-A9B0-C310BF876385}"/>
@@ -9062,7 +9062,7 @@
         </p:sp>
         <p:sp>
           <p:nvSpPr>
-            <p:cNvPr id="93" name="Isosceles Triangle 92">
+            <p:cNvPr id="157" name="Isosceles Triangle 156">
               <a:extLst>
                 <a:ext uri="{FF2B5EF4-FFF2-40B4-BE49-F238E27FC236}">
                   <a16:creationId xmlns:a16="http://schemas.microsoft.com/office/drawing/2014/main" id="{4EFA655C-9E50-4C14-A89E-AD7B648E4E2B}"/>
@@ -9118,7 +9118,7 @@
         </p:sp>
         <p:sp>
           <p:nvSpPr>
-            <p:cNvPr id="94" name="Isosceles Triangle 93">
+            <p:cNvPr id="158" name="Isosceles Triangle 157">
               <a:extLst>
                 <a:ext uri="{FF2B5EF4-FFF2-40B4-BE49-F238E27FC236}">
                   <a16:creationId xmlns:a16="http://schemas.microsoft.com/office/drawing/2014/main" id="{3E843863-7D25-4C01-9A17-E817CB6D998A}"/>
@@ -9175,7 +9175,7 @@
       </p:grpSp>
       <p:sp>
         <p:nvSpPr>
-          <p:cNvPr id="96" name="Rectangle 95">
+          <p:cNvPr id="160" name="Rectangle 159">
             <a:extLst>
               <a:ext uri="{FF2B5EF4-FFF2-40B4-BE49-F238E27FC236}">
                 <a16:creationId xmlns:a16="http://schemas.microsoft.com/office/drawing/2014/main" id="{7941F9B1-B01B-4A84-89D9-B169AEB4E456}"/>
@@ -9245,10 +9245,10 @@
       </p:sp>
       <p:pic>
         <p:nvPicPr>
-          <p:cNvPr id="7170" name="Picture 2">
+          <p:cNvPr id="3074" name="Picture 2">
             <a:extLst>
               <a:ext uri="{FF2B5EF4-FFF2-40B4-BE49-F238E27FC236}">
-                <a16:creationId xmlns:a16="http://schemas.microsoft.com/office/drawing/2014/main" id="{7BEAE8A5-A54D-4C89-A8F7-FB41DA36AD35}"/>
+                <a16:creationId xmlns:a16="http://schemas.microsoft.com/office/drawing/2014/main" id="{0FE1895E-4BF0-44CE-83D8-C132A4CD64E2}"/>
               </a:ext>
             </a:extLst>
           </p:cNvPr>
@@ -9273,8 +9273,8 @@
         </p:blipFill>
         <p:spPr bwMode="auto">
           <a:xfrm>
-            <a:off x="3200796" y="1131994"/>
-            <a:ext cx="5792284" cy="4590386"/>
+            <a:off x="3096687" y="1131994"/>
+            <a:ext cx="6000503" cy="4590386"/>
           </a:xfrm>
           <a:prstGeom prst="rect">
             <a:avLst/>
@@ -10892,7 +10892,7 @@
       </p:grpSpPr>
       <p:grpSp>
         <p:nvGrpSpPr>
-          <p:cNvPr id="71" name="Group 70">
+          <p:cNvPr id="135" name="Group 134">
             <a:extLst>
               <a:ext uri="{FF2B5EF4-FFF2-40B4-BE49-F238E27FC236}">
                 <a16:creationId xmlns:a16="http://schemas.microsoft.com/office/drawing/2014/main" id="{609316A9-990D-4EC3-A671-70EE5C1493A4}"/>
@@ -10923,7 +10923,7 @@
         </p:grpSpPr>
         <p:cxnSp>
           <p:nvCxnSpPr>
-            <p:cNvPr id="72" name="Straight Connector 71">
+            <p:cNvPr id="136" name="Straight Connector 135">
               <a:extLst>
                 <a:ext uri="{FF2B5EF4-FFF2-40B4-BE49-F238E27FC236}">
                   <a16:creationId xmlns:a16="http://schemas.microsoft.com/office/drawing/2014/main" id="{9B0C6109-9159-49CA-AD7A-F9035539DB7F}"/>
@@ -10975,7 +10975,7 @@
         </p:cxnSp>
         <p:cxnSp>
           <p:nvCxnSpPr>
-            <p:cNvPr id="73" name="Straight Connector 72">
+            <p:cNvPr id="137" name="Straight Connector 136">
               <a:extLst>
                 <a:ext uri="{FF2B5EF4-FFF2-40B4-BE49-F238E27FC236}">
                   <a16:creationId xmlns:a16="http://schemas.microsoft.com/office/drawing/2014/main" id="{686F14F5-308C-4EB6-87AB-05DE9501B1AA}"/>
@@ -11027,7 +11027,7 @@
         </p:cxnSp>
         <p:sp>
           <p:nvSpPr>
-            <p:cNvPr id="74" name="Rectangle 23">
+            <p:cNvPr id="138" name="Rectangle 23">
               <a:extLst>
                 <a:ext uri="{FF2B5EF4-FFF2-40B4-BE49-F238E27FC236}">
                   <a16:creationId xmlns:a16="http://schemas.microsoft.com/office/drawing/2014/main" id="{BA032363-A188-47C5-9D59-9B788809DCD2}"/>
@@ -11105,7 +11105,7 @@
         </p:sp>
         <p:sp>
           <p:nvSpPr>
-            <p:cNvPr id="75" name="Rectangle 25">
+            <p:cNvPr id="139" name="Rectangle 25">
               <a:extLst>
                 <a:ext uri="{FF2B5EF4-FFF2-40B4-BE49-F238E27FC236}">
                   <a16:creationId xmlns:a16="http://schemas.microsoft.com/office/drawing/2014/main" id="{2C4077DF-6BB9-4069-AD28-6B1664EBB064}"/>
@@ -11183,7 +11183,7 @@
         </p:sp>
         <p:sp>
           <p:nvSpPr>
-            <p:cNvPr id="76" name="Isosceles Triangle 75">
+            <p:cNvPr id="140" name="Isosceles Triangle 139">
               <a:extLst>
                 <a:ext uri="{FF2B5EF4-FFF2-40B4-BE49-F238E27FC236}">
                   <a16:creationId xmlns:a16="http://schemas.microsoft.com/office/drawing/2014/main" id="{1D2B8B50-3419-41ED-9A9F-3CF9EEBBD3F2}"/>
@@ -11239,7 +11239,7 @@
         </p:sp>
         <p:sp>
           <p:nvSpPr>
-            <p:cNvPr id="77" name="Rectangle 27">
+            <p:cNvPr id="141" name="Rectangle 27">
               <a:extLst>
                 <a:ext uri="{FF2B5EF4-FFF2-40B4-BE49-F238E27FC236}">
                   <a16:creationId xmlns:a16="http://schemas.microsoft.com/office/drawing/2014/main" id="{5C640498-2E73-4FA2-BEB6-C3596A458C8A}"/>
@@ -11318,7 +11318,7 @@
         </p:sp>
         <p:sp>
           <p:nvSpPr>
-            <p:cNvPr id="78" name="Rectangle 28">
+            <p:cNvPr id="142" name="Rectangle 28">
               <a:extLst>
                 <a:ext uri="{FF2B5EF4-FFF2-40B4-BE49-F238E27FC236}">
                   <a16:creationId xmlns:a16="http://schemas.microsoft.com/office/drawing/2014/main" id="{3240EEFC-4112-4C39-A816-C815774F6D69}"/>
@@ -11398,7 +11398,7 @@
         </p:sp>
         <p:sp>
           <p:nvSpPr>
-            <p:cNvPr id="79" name="Rectangle 29">
+            <p:cNvPr id="143" name="Rectangle 29">
               <a:extLst>
                 <a:ext uri="{FF2B5EF4-FFF2-40B4-BE49-F238E27FC236}">
                   <a16:creationId xmlns:a16="http://schemas.microsoft.com/office/drawing/2014/main" id="{ADF362B0-03EA-4800-9FAA-9F128587E428}"/>
@@ -11476,7 +11476,7 @@
         </p:sp>
         <p:sp>
           <p:nvSpPr>
-            <p:cNvPr id="80" name="Isosceles Triangle 79">
+            <p:cNvPr id="144" name="Isosceles Triangle 143">
               <a:extLst>
                 <a:ext uri="{FF2B5EF4-FFF2-40B4-BE49-F238E27FC236}">
                   <a16:creationId xmlns:a16="http://schemas.microsoft.com/office/drawing/2014/main" id="{0BA84559-2F4C-4795-9246-4C563F942DB9}"/>
@@ -11532,7 +11532,7 @@
         </p:sp>
         <p:sp>
           <p:nvSpPr>
-            <p:cNvPr id="81" name="Isosceles Triangle 80">
+            <p:cNvPr id="145" name="Isosceles Triangle 144">
               <a:extLst>
                 <a:ext uri="{FF2B5EF4-FFF2-40B4-BE49-F238E27FC236}">
                   <a16:creationId xmlns:a16="http://schemas.microsoft.com/office/drawing/2014/main" id="{FA77A1AA-CA47-4A91-A0A1-0A8CE31A985E}"/>
@@ -11589,7 +11589,7 @@
       </p:grpSp>
       <p:sp>
         <p:nvSpPr>
-          <p:cNvPr id="83" name="Rectangle 82">
+          <p:cNvPr id="147" name="Rectangle 146">
             <a:extLst>
               <a:ext uri="{FF2B5EF4-FFF2-40B4-BE49-F238E27FC236}">
                 <a16:creationId xmlns:a16="http://schemas.microsoft.com/office/drawing/2014/main" id="{03E8462A-FEBA-4848-81CC-3F8DA3E477BE}"/>
@@ -11652,7 +11652,7 @@
       </p:sp>
       <p:grpSp>
         <p:nvGrpSpPr>
-          <p:cNvPr id="85" name="Group 84">
+          <p:cNvPr id="149" name="Group 148">
             <a:extLst>
               <a:ext uri="{FF2B5EF4-FFF2-40B4-BE49-F238E27FC236}">
                 <a16:creationId xmlns:a16="http://schemas.microsoft.com/office/drawing/2014/main" id="{2109F83F-40FE-4DB3-84CC-09FB3340D06D}"/>
@@ -11683,7 +11683,7 @@
         </p:grpSpPr>
         <p:cxnSp>
           <p:nvCxnSpPr>
-            <p:cNvPr id="86" name="Straight Connector 85">
+            <p:cNvPr id="150" name="Straight Connector 149">
               <a:extLst>
                 <a:ext uri="{FF2B5EF4-FFF2-40B4-BE49-F238E27FC236}">
                   <a16:creationId xmlns:a16="http://schemas.microsoft.com/office/drawing/2014/main" id="{1DE492D7-C3C3-48FF-80C8-37021EA0262F}"/>
@@ -11735,7 +11735,7 @@
         </p:cxnSp>
         <p:sp>
           <p:nvSpPr>
-            <p:cNvPr id="87" name="Rectangle 23">
+            <p:cNvPr id="151" name="Rectangle 23">
               <a:extLst>
                 <a:ext uri="{FF2B5EF4-FFF2-40B4-BE49-F238E27FC236}">
                   <a16:creationId xmlns:a16="http://schemas.microsoft.com/office/drawing/2014/main" id="{0B30FF97-2E9A-490A-AED2-90BA2E0EC17F}"/>
@@ -11813,7 +11813,7 @@
         </p:sp>
         <p:sp>
           <p:nvSpPr>
-            <p:cNvPr id="88" name="Rectangle 25">
+            <p:cNvPr id="152" name="Rectangle 25">
               <a:extLst>
                 <a:ext uri="{FF2B5EF4-FFF2-40B4-BE49-F238E27FC236}">
                   <a16:creationId xmlns:a16="http://schemas.microsoft.com/office/drawing/2014/main" id="{B6D53C7D-A312-47B6-A66A-230A19CFACA6}"/>
@@ -11891,7 +11891,7 @@
         </p:sp>
         <p:sp>
           <p:nvSpPr>
-            <p:cNvPr id="89" name="Isosceles Triangle 88">
+            <p:cNvPr id="153" name="Isosceles Triangle 152">
               <a:extLst>
                 <a:ext uri="{FF2B5EF4-FFF2-40B4-BE49-F238E27FC236}">
                   <a16:creationId xmlns:a16="http://schemas.microsoft.com/office/drawing/2014/main" id="{9329D58C-0D2E-4A2B-AD6A-9CEE506784A8}"/>
@@ -11947,7 +11947,7 @@
         </p:sp>
         <p:sp>
           <p:nvSpPr>
-            <p:cNvPr id="90" name="Rectangle 27">
+            <p:cNvPr id="154" name="Rectangle 27">
               <a:extLst>
                 <a:ext uri="{FF2B5EF4-FFF2-40B4-BE49-F238E27FC236}">
                   <a16:creationId xmlns:a16="http://schemas.microsoft.com/office/drawing/2014/main" id="{9D446EDE-C690-4461-8BF2-7634808FC8B4}"/>
@@ -12026,7 +12026,7 @@
         </p:sp>
         <p:sp>
           <p:nvSpPr>
-            <p:cNvPr id="91" name="Rectangle 28">
+            <p:cNvPr id="155" name="Rectangle 28">
               <a:extLst>
                 <a:ext uri="{FF2B5EF4-FFF2-40B4-BE49-F238E27FC236}">
                   <a16:creationId xmlns:a16="http://schemas.microsoft.com/office/drawing/2014/main" id="{323F3D34-6531-4AD7-A8C6-195A090281A1}"/>
@@ -12106,7 +12106,7 @@
         </p:sp>
         <p:sp>
           <p:nvSpPr>
-            <p:cNvPr id="92" name="Rectangle 29">
+            <p:cNvPr id="156" name="Rectangle 29">
               <a:extLst>
                 <a:ext uri="{FF2B5EF4-FFF2-40B4-BE49-F238E27FC236}">
                   <a16:creationId xmlns:a16="http://schemas.microsoft.com/office/drawing/2014/main" id="{B9B0AE3F-2350-435F-A9B0-C310BF876385}"/>
@@ -12184,7 +12184,7 @@
         </p:sp>
         <p:sp>
           <p:nvSpPr>
-            <p:cNvPr id="93" name="Isosceles Triangle 92">
+            <p:cNvPr id="157" name="Isosceles Triangle 156">
               <a:extLst>
                 <a:ext uri="{FF2B5EF4-FFF2-40B4-BE49-F238E27FC236}">
                   <a16:creationId xmlns:a16="http://schemas.microsoft.com/office/drawing/2014/main" id="{4EFA655C-9E50-4C14-A89E-AD7B648E4E2B}"/>
@@ -12240,7 +12240,7 @@
         </p:sp>
         <p:sp>
           <p:nvSpPr>
-            <p:cNvPr id="94" name="Isosceles Triangle 93">
+            <p:cNvPr id="158" name="Isosceles Triangle 157">
               <a:extLst>
                 <a:ext uri="{FF2B5EF4-FFF2-40B4-BE49-F238E27FC236}">
                   <a16:creationId xmlns:a16="http://schemas.microsoft.com/office/drawing/2014/main" id="{3E843863-7D25-4C01-9A17-E817CB6D998A}"/>
@@ -12297,7 +12297,7 @@
       </p:grpSp>
       <p:sp>
         <p:nvSpPr>
-          <p:cNvPr id="96" name="Rectangle 95">
+          <p:cNvPr id="160" name="Rectangle 159">
             <a:extLst>
               <a:ext uri="{FF2B5EF4-FFF2-40B4-BE49-F238E27FC236}">
                 <a16:creationId xmlns:a16="http://schemas.microsoft.com/office/drawing/2014/main" id="{7941F9B1-B01B-4A84-89D9-B169AEB4E456}"/>
@@ -12367,10 +12367,10 @@
       </p:sp>
       <p:pic>
         <p:nvPicPr>
-          <p:cNvPr id="9218" name="Picture 2">
+          <p:cNvPr id="2050" name="Picture 2">
             <a:extLst>
               <a:ext uri="{FF2B5EF4-FFF2-40B4-BE49-F238E27FC236}">
-                <a16:creationId xmlns:a16="http://schemas.microsoft.com/office/drawing/2014/main" id="{43888C06-A899-40EB-BD99-F74A5F2D9545}"/>
+                <a16:creationId xmlns:a16="http://schemas.microsoft.com/office/drawing/2014/main" id="{1CB785CF-60B2-461B-B655-E55F4AFFAB6C}"/>
               </a:ext>
             </a:extLst>
           </p:cNvPr>
@@ -12395,8 +12395,8 @@
         </p:blipFill>
         <p:spPr bwMode="auto">
           <a:xfrm>
-            <a:off x="1704225" y="1131994"/>
-            <a:ext cx="8785426" cy="4590386"/>
+            <a:off x="1596561" y="1131994"/>
+            <a:ext cx="9000754" cy="4590386"/>
           </a:xfrm>
           <a:prstGeom prst="rect">
             <a:avLst/>
@@ -12603,7 +12603,7 @@
       </p:grpSpPr>
       <p:grpSp>
         <p:nvGrpSpPr>
-          <p:cNvPr id="71" name="Group 70">
+          <p:cNvPr id="135" name="Group 134">
             <a:extLst>
               <a:ext uri="{FF2B5EF4-FFF2-40B4-BE49-F238E27FC236}">
                 <a16:creationId xmlns:a16="http://schemas.microsoft.com/office/drawing/2014/main" id="{B4DE830A-B531-4A3B-96F6-0ECE88B08555}"/>
@@ -12634,7 +12634,7 @@
         </p:grpSpPr>
         <p:cxnSp>
           <p:nvCxnSpPr>
-            <p:cNvPr id="72" name="Straight Connector 71">
+            <p:cNvPr id="136" name="Straight Connector 135">
               <a:extLst>
                 <a:ext uri="{FF2B5EF4-FFF2-40B4-BE49-F238E27FC236}">
                   <a16:creationId xmlns:a16="http://schemas.microsoft.com/office/drawing/2014/main" id="{2813DF2C-461A-4A8F-9679-A172790D1F3A}"/>
@@ -12686,7 +12686,7 @@
         </p:cxnSp>
         <p:cxnSp>
           <p:nvCxnSpPr>
-            <p:cNvPr id="73" name="Straight Connector 72">
+            <p:cNvPr id="137" name="Straight Connector 136">
               <a:extLst>
                 <a:ext uri="{FF2B5EF4-FFF2-40B4-BE49-F238E27FC236}">
                   <a16:creationId xmlns:a16="http://schemas.microsoft.com/office/drawing/2014/main" id="{54CD3A85-C039-4249-86E4-1EB9318B5495}"/>
@@ -12738,7 +12738,7 @@
         </p:cxnSp>
         <p:sp>
           <p:nvSpPr>
-            <p:cNvPr id="74" name="Rectangle 23">
+            <p:cNvPr id="138" name="Rectangle 23">
               <a:extLst>
                 <a:ext uri="{FF2B5EF4-FFF2-40B4-BE49-F238E27FC236}">
                   <a16:creationId xmlns:a16="http://schemas.microsoft.com/office/drawing/2014/main" id="{887EA6D2-2883-42C2-993D-094CA6D65DA3}"/>
@@ -12816,7 +12816,7 @@
         </p:sp>
         <p:sp>
           <p:nvSpPr>
-            <p:cNvPr id="75" name="Rectangle 25">
+            <p:cNvPr id="139" name="Rectangle 25">
               <a:extLst>
                 <a:ext uri="{FF2B5EF4-FFF2-40B4-BE49-F238E27FC236}">
                   <a16:creationId xmlns:a16="http://schemas.microsoft.com/office/drawing/2014/main" id="{3B895046-636F-4D1B-ACA4-29AA0CB3329F}"/>
@@ -12894,7 +12894,7 @@
         </p:sp>
         <p:sp>
           <p:nvSpPr>
-            <p:cNvPr id="76" name="Isosceles Triangle 75">
+            <p:cNvPr id="140" name="Isosceles Triangle 139">
               <a:extLst>
                 <a:ext uri="{FF2B5EF4-FFF2-40B4-BE49-F238E27FC236}">
                   <a16:creationId xmlns:a16="http://schemas.microsoft.com/office/drawing/2014/main" id="{C6B0CDE3-E054-4EDD-A43B-F96843D8BF51}"/>
@@ -12950,7 +12950,7 @@
         </p:sp>
         <p:sp>
           <p:nvSpPr>
-            <p:cNvPr id="77" name="Rectangle 27">
+            <p:cNvPr id="141" name="Rectangle 27">
               <a:extLst>
                 <a:ext uri="{FF2B5EF4-FFF2-40B4-BE49-F238E27FC236}">
                   <a16:creationId xmlns:a16="http://schemas.microsoft.com/office/drawing/2014/main" id="{3B66B1A2-F145-4C9B-85CC-4BF30D58CBC5}"/>
@@ -13029,7 +13029,7 @@
         </p:sp>
         <p:sp>
           <p:nvSpPr>
-            <p:cNvPr id="78" name="Rectangle 28">
+            <p:cNvPr id="142" name="Rectangle 28">
               <a:extLst>
                 <a:ext uri="{FF2B5EF4-FFF2-40B4-BE49-F238E27FC236}">
                   <a16:creationId xmlns:a16="http://schemas.microsoft.com/office/drawing/2014/main" id="{5D4FC972-94B3-4035-8D31-E668C132B411}"/>
@@ -13109,7 +13109,7 @@
         </p:sp>
         <p:sp>
           <p:nvSpPr>
-            <p:cNvPr id="79" name="Rectangle 29">
+            <p:cNvPr id="143" name="Rectangle 29">
               <a:extLst>
                 <a:ext uri="{FF2B5EF4-FFF2-40B4-BE49-F238E27FC236}">
                   <a16:creationId xmlns:a16="http://schemas.microsoft.com/office/drawing/2014/main" id="{374B9941-AFBE-4A77-A50E-B6EA04A746AE}"/>
@@ -13187,7 +13187,7 @@
         </p:sp>
         <p:sp>
           <p:nvSpPr>
-            <p:cNvPr id="80" name="Isosceles Triangle 79">
+            <p:cNvPr id="144" name="Isosceles Triangle 143">
               <a:extLst>
                 <a:ext uri="{FF2B5EF4-FFF2-40B4-BE49-F238E27FC236}">
                   <a16:creationId xmlns:a16="http://schemas.microsoft.com/office/drawing/2014/main" id="{27A982C5-2C38-4CE9-BC18-94697AD657FB}"/>
@@ -13243,7 +13243,7 @@
         </p:sp>
         <p:sp>
           <p:nvSpPr>
-            <p:cNvPr id="81" name="Isosceles Triangle 80">
+            <p:cNvPr id="145" name="Isosceles Triangle 144">
               <a:extLst>
                 <a:ext uri="{FF2B5EF4-FFF2-40B4-BE49-F238E27FC236}">
                   <a16:creationId xmlns:a16="http://schemas.microsoft.com/office/drawing/2014/main" id="{0060D8D1-7BB1-498F-AFBB-ADAC130A9E90}"/>
@@ -13316,8 +13316,8 @@
         </p:nvSpPr>
         <p:spPr>
           <a:xfrm>
-            <a:off x="1330101" y="5079052"/>
-            <a:ext cx="8288032" cy="1096316"/>
+            <a:off x="6094855" y="1261331"/>
+            <a:ext cx="3497565" cy="3002662"/>
           </a:xfrm>
         </p:spPr>
         <p:txBody>
@@ -13326,9 +13326,8 @@
           </a:bodyPr>
           <a:lstStyle/>
           <a:p>
-            <a:pPr algn="ctr"/>
             <a:r>
-              <a:rPr lang="en-US" sz="4800" kern="1200" dirty="0">
+              <a:rPr lang="en-US" sz="4400" kern="1200">
                 <a:solidFill>
                   <a:schemeClr val="accent1"/>
                 </a:solidFill>
@@ -13340,6 +13339,64 @@
             </a:r>
           </a:p>
         </p:txBody>
+      </p:sp>
+      <p:sp>
+        <p:nvSpPr>
+          <p:cNvPr id="147" name="Isosceles Triangle 146">
+            <a:extLst>
+              <a:ext uri="{FF2B5EF4-FFF2-40B4-BE49-F238E27FC236}">
+                <a16:creationId xmlns:a16="http://schemas.microsoft.com/office/drawing/2014/main" id="{AA330523-F25B-4007-B3E5-ABB5637D160A}"/>
+              </a:ext>
+              <a:ext uri="{C183D7F6-B498-43B3-948B-1728B52AA6E4}">
+                <adec:decorative xmlns:adec="http://schemas.microsoft.com/office/drawing/2017/decorative" val="1"/>
+              </a:ext>
+            </a:extLst>
+          </p:cNvPr>
+          <p:cNvSpPr>
+            <a:spLocks noGrp="1" noRot="1" noChangeAspect="1" noMove="1" noResize="1" noEditPoints="1" noAdjustHandles="1" noChangeArrowheads="1" noChangeShapeType="1" noTextEdit="1"/>
+          </p:cNvSpPr>
+          <p:nvPr>
+            <p:extLst>
+              <p:ext uri="{386F3935-93C4-4BCD-93E2-E3B085C9AB24}">
+                <p16:designElem xmlns:p16="http://schemas.microsoft.com/office/powerpoint/2015/main" val="1"/>
+              </p:ext>
+            </p:extLst>
+          </p:nvPr>
+        </p:nvSpPr>
+        <p:spPr>
+          <a:xfrm rot="10800000">
+            <a:off x="3174" y="12700"/>
+            <a:ext cx="842596" cy="5666154"/>
+          </a:xfrm>
+          <a:prstGeom prst="triangle">
+            <a:avLst>
+              <a:gd name="adj" fmla="val 100000"/>
+            </a:avLst>
+          </a:prstGeom>
+          <a:solidFill>
+            <a:schemeClr val="accent1">
+              <a:alpha val="85000"/>
+            </a:schemeClr>
+          </a:solidFill>
+          <a:ln>
+            <a:noFill/>
+          </a:ln>
+          <a:effectLst/>
+        </p:spPr>
+        <p:style>
+          <a:lnRef idx="1">
+            <a:schemeClr val="accent1"/>
+          </a:lnRef>
+          <a:fillRef idx="3">
+            <a:schemeClr val="accent1"/>
+          </a:fillRef>
+          <a:effectRef idx="2">
+            <a:schemeClr val="accent1"/>
+          </a:effectRef>
+          <a:fontRef idx="minor">
+            <a:schemeClr val="lt1"/>
+          </a:fontRef>
+        </p:style>
       </p:sp>
       <p:pic>
         <p:nvPicPr>
@@ -13369,8 +13426,8 @@
         </p:blipFill>
         <p:spPr bwMode="auto">
           <a:xfrm>
-            <a:off x="2222429" y="407390"/>
-            <a:ext cx="5956371" cy="4586407"/>
+            <a:off x="888603" y="1547368"/>
+            <a:ext cx="4887354" cy="3763263"/>
           </a:xfrm>
           <a:prstGeom prst="rect">
             <a:avLst/>
@@ -13425,6 +13482,703 @@
           <a:chExt cx="0" cy="0"/>
         </a:xfrm>
       </p:grpSpPr>
+      <p:grpSp>
+        <p:nvGrpSpPr>
+          <p:cNvPr id="71" name="Group 70">
+            <a:extLst>
+              <a:ext uri="{FF2B5EF4-FFF2-40B4-BE49-F238E27FC236}">
+                <a16:creationId xmlns:a16="http://schemas.microsoft.com/office/drawing/2014/main" id="{B4DE830A-B531-4A3B-96F6-0ECE88B08555}"/>
+              </a:ext>
+              <a:ext uri="{C183D7F6-B498-43B3-948B-1728B52AA6E4}">
+                <adec:decorative xmlns:adec="http://schemas.microsoft.com/office/drawing/2017/decorative" val="1"/>
+              </a:ext>
+            </a:extLst>
+          </p:cNvPr>
+          <p:cNvGrpSpPr>
+            <a:grpSpLocks noGrp="1" noUngrp="1" noRot="1" noChangeAspect="1" noMove="1" noResize="1"/>
+          </p:cNvGrpSpPr>
+          <p:nvPr>
+            <p:extLst>
+              <p:ext uri="{386F3935-93C4-4BCD-93E2-E3B085C9AB24}">
+                <p16:designElem xmlns:p16="http://schemas.microsoft.com/office/powerpoint/2015/main" val="1"/>
+              </p:ext>
+            </p:extLst>
+          </p:nvPr>
+        </p:nvGrpSpPr>
+        <p:grpSpPr>
+          <a:xfrm>
+            <a:off x="0" y="-8467"/>
+            <a:ext cx="12192000" cy="6866467"/>
+            <a:chOff x="0" y="-8467"/>
+            <a:chExt cx="12192000" cy="6866467"/>
+          </a:xfrm>
+        </p:grpSpPr>
+        <p:cxnSp>
+          <p:nvCxnSpPr>
+            <p:cNvPr id="72" name="Straight Connector 71">
+              <a:extLst>
+                <a:ext uri="{FF2B5EF4-FFF2-40B4-BE49-F238E27FC236}">
+                  <a16:creationId xmlns:a16="http://schemas.microsoft.com/office/drawing/2014/main" id="{2813DF2C-461A-4A8F-9679-A172790D1F3A}"/>
+                </a:ext>
+                <a:ext uri="{C183D7F6-B498-43B3-948B-1728B52AA6E4}">
+                  <adec:decorative xmlns:adec="http://schemas.microsoft.com/office/drawing/2017/decorative" val="1"/>
+                </a:ext>
+              </a:extLst>
+            </p:cNvPr>
+            <p:cNvCxnSpPr/>
+            <p:nvPr>
+              <p:extLst>
+                <p:ext uri="{386F3935-93C4-4BCD-93E2-E3B085C9AB24}">
+                  <p16:designElem xmlns:p16="http://schemas.microsoft.com/office/powerpoint/2015/main" val="1"/>
+                </p:ext>
+              </p:extLst>
+            </p:nvPr>
+          </p:nvCxnSpPr>
+          <p:spPr>
+            <a:xfrm>
+              <a:off x="9371012" y="0"/>
+              <a:ext cx="1219200" cy="6858000"/>
+            </a:xfrm>
+            <a:prstGeom prst="line">
+              <a:avLst/>
+            </a:prstGeom>
+            <a:ln w="9525">
+              <a:solidFill>
+                <a:schemeClr val="bg1">
+                  <a:lumMod val="75000"/>
+                </a:schemeClr>
+              </a:solidFill>
+            </a:ln>
+          </p:spPr>
+          <p:style>
+            <a:lnRef idx="2">
+              <a:schemeClr val="accent1"/>
+            </a:lnRef>
+            <a:fillRef idx="0">
+              <a:schemeClr val="accent1"/>
+            </a:fillRef>
+            <a:effectRef idx="1">
+              <a:schemeClr val="accent1"/>
+            </a:effectRef>
+            <a:fontRef idx="minor">
+              <a:schemeClr val="tx1"/>
+            </a:fontRef>
+          </p:style>
+        </p:cxnSp>
+        <p:cxnSp>
+          <p:nvCxnSpPr>
+            <p:cNvPr id="73" name="Straight Connector 72">
+              <a:extLst>
+                <a:ext uri="{FF2B5EF4-FFF2-40B4-BE49-F238E27FC236}">
+                  <a16:creationId xmlns:a16="http://schemas.microsoft.com/office/drawing/2014/main" id="{54CD3A85-C039-4249-86E4-1EB9318B5495}"/>
+                </a:ext>
+                <a:ext uri="{C183D7F6-B498-43B3-948B-1728B52AA6E4}">
+                  <adec:decorative xmlns:adec="http://schemas.microsoft.com/office/drawing/2017/decorative" val="1"/>
+                </a:ext>
+              </a:extLst>
+            </p:cNvPr>
+            <p:cNvCxnSpPr/>
+            <p:nvPr>
+              <p:extLst>
+                <p:ext uri="{386F3935-93C4-4BCD-93E2-E3B085C9AB24}">
+                  <p16:designElem xmlns:p16="http://schemas.microsoft.com/office/powerpoint/2015/main" val="1"/>
+                </p:ext>
+              </p:extLst>
+            </p:nvPr>
+          </p:nvCxnSpPr>
+          <p:spPr>
+            <a:xfrm flipH="1">
+              <a:off x="7425267" y="3681413"/>
+              <a:ext cx="4763558" cy="3176587"/>
+            </a:xfrm>
+            <a:prstGeom prst="line">
+              <a:avLst/>
+            </a:prstGeom>
+            <a:ln w="9525">
+              <a:solidFill>
+                <a:schemeClr val="bg1">
+                  <a:lumMod val="85000"/>
+                </a:schemeClr>
+              </a:solidFill>
+            </a:ln>
+          </p:spPr>
+          <p:style>
+            <a:lnRef idx="2">
+              <a:schemeClr val="accent1"/>
+            </a:lnRef>
+            <a:fillRef idx="0">
+              <a:schemeClr val="accent1"/>
+            </a:fillRef>
+            <a:effectRef idx="1">
+              <a:schemeClr val="accent1"/>
+            </a:effectRef>
+            <a:fontRef idx="minor">
+              <a:schemeClr val="tx1"/>
+            </a:fontRef>
+          </p:style>
+        </p:cxnSp>
+        <p:sp>
+          <p:nvSpPr>
+            <p:cNvPr id="74" name="Rectangle 23">
+              <a:extLst>
+                <a:ext uri="{FF2B5EF4-FFF2-40B4-BE49-F238E27FC236}">
+                  <a16:creationId xmlns:a16="http://schemas.microsoft.com/office/drawing/2014/main" id="{887EA6D2-2883-42C2-993D-094CA6D65DA3}"/>
+                </a:ext>
+                <a:ext uri="{C183D7F6-B498-43B3-948B-1728B52AA6E4}">
+                  <adec:decorative xmlns:adec="http://schemas.microsoft.com/office/drawing/2017/decorative" val="1"/>
+                </a:ext>
+              </a:extLst>
+            </p:cNvPr>
+            <p:cNvSpPr/>
+            <p:nvPr>
+              <p:extLst>
+                <p:ext uri="{386F3935-93C4-4BCD-93E2-E3B085C9AB24}">
+                  <p16:designElem xmlns:p16="http://schemas.microsoft.com/office/powerpoint/2015/main" val="1"/>
+                </p:ext>
+              </p:extLst>
+            </p:nvPr>
+          </p:nvSpPr>
+          <p:spPr>
+            <a:xfrm>
+              <a:off x="9181476" y="-8467"/>
+              <a:ext cx="3007349" cy="6866467"/>
+            </a:xfrm>
+            <a:custGeom>
+              <a:avLst/>
+              <a:gdLst/>
+              <a:ahLst/>
+              <a:cxnLst/>
+              <a:rect l="l" t="t" r="r" b="b"/>
+              <a:pathLst>
+                <a:path w="3007349" h="6866467">
+                  <a:moveTo>
+                    <a:pt x="2045532" y="0"/>
+                  </a:moveTo>
+                  <a:lnTo>
+                    <a:pt x="3007349" y="0"/>
+                  </a:lnTo>
+                  <a:lnTo>
+                    <a:pt x="3007349" y="6866467"/>
+                  </a:lnTo>
+                  <a:lnTo>
+                    <a:pt x="0" y="6866467"/>
+                  </a:lnTo>
+                  <a:lnTo>
+                    <a:pt x="2045532" y="0"/>
+                  </a:lnTo>
+                  <a:close/>
+                </a:path>
+              </a:pathLst>
+            </a:custGeom>
+            <a:solidFill>
+              <a:schemeClr val="accent1">
+                <a:alpha val="30000"/>
+              </a:schemeClr>
+            </a:solidFill>
+            <a:ln>
+              <a:noFill/>
+            </a:ln>
+            <a:effectLst/>
+          </p:spPr>
+          <p:style>
+            <a:lnRef idx="1">
+              <a:schemeClr val="accent1"/>
+            </a:lnRef>
+            <a:fillRef idx="3">
+              <a:schemeClr val="accent1"/>
+            </a:fillRef>
+            <a:effectRef idx="2">
+              <a:schemeClr val="accent1"/>
+            </a:effectRef>
+            <a:fontRef idx="minor">
+              <a:schemeClr val="lt1"/>
+            </a:fontRef>
+          </p:style>
+        </p:sp>
+        <p:sp>
+          <p:nvSpPr>
+            <p:cNvPr id="75" name="Rectangle 25">
+              <a:extLst>
+                <a:ext uri="{FF2B5EF4-FFF2-40B4-BE49-F238E27FC236}">
+                  <a16:creationId xmlns:a16="http://schemas.microsoft.com/office/drawing/2014/main" id="{3B895046-636F-4D1B-ACA4-29AA0CB3329F}"/>
+                </a:ext>
+                <a:ext uri="{C183D7F6-B498-43B3-948B-1728B52AA6E4}">
+                  <adec:decorative xmlns:adec="http://schemas.microsoft.com/office/drawing/2017/decorative" val="1"/>
+                </a:ext>
+              </a:extLst>
+            </p:cNvPr>
+            <p:cNvSpPr/>
+            <p:nvPr>
+              <p:extLst>
+                <p:ext uri="{386F3935-93C4-4BCD-93E2-E3B085C9AB24}">
+                  <p16:designElem xmlns:p16="http://schemas.microsoft.com/office/powerpoint/2015/main" val="1"/>
+                </p:ext>
+              </p:extLst>
+            </p:nvPr>
+          </p:nvSpPr>
+          <p:spPr>
+            <a:xfrm>
+              <a:off x="9603442" y="-8467"/>
+              <a:ext cx="2588558" cy="6866467"/>
+            </a:xfrm>
+            <a:custGeom>
+              <a:avLst/>
+              <a:gdLst/>
+              <a:ahLst/>
+              <a:cxnLst/>
+              <a:rect l="l" t="t" r="r" b="b"/>
+              <a:pathLst>
+                <a:path w="2573311" h="6866467">
+                  <a:moveTo>
+                    <a:pt x="0" y="0"/>
+                  </a:moveTo>
+                  <a:lnTo>
+                    <a:pt x="2573311" y="0"/>
+                  </a:lnTo>
+                  <a:lnTo>
+                    <a:pt x="2573311" y="6866467"/>
+                  </a:lnTo>
+                  <a:lnTo>
+                    <a:pt x="1202336" y="6866467"/>
+                  </a:lnTo>
+                  <a:lnTo>
+                    <a:pt x="0" y="0"/>
+                  </a:lnTo>
+                  <a:close/>
+                </a:path>
+              </a:pathLst>
+            </a:custGeom>
+            <a:solidFill>
+              <a:schemeClr val="accent1">
+                <a:alpha val="20000"/>
+              </a:schemeClr>
+            </a:solidFill>
+            <a:ln>
+              <a:noFill/>
+            </a:ln>
+            <a:effectLst/>
+          </p:spPr>
+          <p:style>
+            <a:lnRef idx="1">
+              <a:schemeClr val="accent1"/>
+            </a:lnRef>
+            <a:fillRef idx="3">
+              <a:schemeClr val="accent1"/>
+            </a:fillRef>
+            <a:effectRef idx="2">
+              <a:schemeClr val="accent1"/>
+            </a:effectRef>
+            <a:fontRef idx="minor">
+              <a:schemeClr val="lt1"/>
+            </a:fontRef>
+          </p:style>
+        </p:sp>
+        <p:sp>
+          <p:nvSpPr>
+            <p:cNvPr id="76" name="Isosceles Triangle 75">
+              <a:extLst>
+                <a:ext uri="{FF2B5EF4-FFF2-40B4-BE49-F238E27FC236}">
+                  <a16:creationId xmlns:a16="http://schemas.microsoft.com/office/drawing/2014/main" id="{C6B0CDE3-E054-4EDD-A43B-F96843D8BF51}"/>
+                </a:ext>
+                <a:ext uri="{C183D7F6-B498-43B3-948B-1728B52AA6E4}">
+                  <adec:decorative xmlns:adec="http://schemas.microsoft.com/office/drawing/2017/decorative" val="1"/>
+                </a:ext>
+              </a:extLst>
+            </p:cNvPr>
+            <p:cNvSpPr/>
+            <p:nvPr>
+              <p:extLst>
+                <p:ext uri="{386F3935-93C4-4BCD-93E2-E3B085C9AB24}">
+                  <p16:designElem xmlns:p16="http://schemas.microsoft.com/office/powerpoint/2015/main" val="1"/>
+                </p:ext>
+              </p:extLst>
+            </p:nvPr>
+          </p:nvSpPr>
+          <p:spPr>
+            <a:xfrm>
+              <a:off x="8932333" y="3048000"/>
+              <a:ext cx="3259667" cy="3810000"/>
+            </a:xfrm>
+            <a:prstGeom prst="triangle">
+              <a:avLst>
+                <a:gd name="adj" fmla="val 100000"/>
+              </a:avLst>
+            </a:prstGeom>
+            <a:solidFill>
+              <a:schemeClr val="accent2">
+                <a:alpha val="72000"/>
+              </a:schemeClr>
+            </a:solidFill>
+            <a:ln>
+              <a:noFill/>
+            </a:ln>
+            <a:effectLst/>
+          </p:spPr>
+          <p:style>
+            <a:lnRef idx="1">
+              <a:schemeClr val="accent1"/>
+            </a:lnRef>
+            <a:fillRef idx="3">
+              <a:schemeClr val="accent1"/>
+            </a:fillRef>
+            <a:effectRef idx="2">
+              <a:schemeClr val="accent1"/>
+            </a:effectRef>
+            <a:fontRef idx="minor">
+              <a:schemeClr val="lt1"/>
+            </a:fontRef>
+          </p:style>
+        </p:sp>
+        <p:sp>
+          <p:nvSpPr>
+            <p:cNvPr id="77" name="Rectangle 27">
+              <a:extLst>
+                <a:ext uri="{FF2B5EF4-FFF2-40B4-BE49-F238E27FC236}">
+                  <a16:creationId xmlns:a16="http://schemas.microsoft.com/office/drawing/2014/main" id="{3B66B1A2-F145-4C9B-85CC-4BF30D58CBC5}"/>
+                </a:ext>
+                <a:ext uri="{C183D7F6-B498-43B3-948B-1728B52AA6E4}">
+                  <adec:decorative xmlns:adec="http://schemas.microsoft.com/office/drawing/2017/decorative" val="1"/>
+                </a:ext>
+              </a:extLst>
+            </p:cNvPr>
+            <p:cNvSpPr/>
+            <p:nvPr>
+              <p:extLst>
+                <p:ext uri="{386F3935-93C4-4BCD-93E2-E3B085C9AB24}">
+                  <p16:designElem xmlns:p16="http://schemas.microsoft.com/office/powerpoint/2015/main" val="1"/>
+                </p:ext>
+              </p:extLst>
+            </p:nvPr>
+          </p:nvSpPr>
+          <p:spPr>
+            <a:xfrm>
+              <a:off x="9334500" y="-8467"/>
+              <a:ext cx="2854326" cy="6866467"/>
+            </a:xfrm>
+            <a:custGeom>
+              <a:avLst/>
+              <a:gdLst/>
+              <a:ahLst/>
+              <a:cxnLst/>
+              <a:rect l="l" t="t" r="r" b="b"/>
+              <a:pathLst>
+                <a:path w="2858013" h="6866467">
+                  <a:moveTo>
+                    <a:pt x="0" y="0"/>
+                  </a:moveTo>
+                  <a:lnTo>
+                    <a:pt x="2858013" y="0"/>
+                  </a:lnTo>
+                  <a:lnTo>
+                    <a:pt x="2858013" y="6866467"/>
+                  </a:lnTo>
+                  <a:lnTo>
+                    <a:pt x="2473942" y="6866467"/>
+                  </a:lnTo>
+                  <a:lnTo>
+                    <a:pt x="0" y="0"/>
+                  </a:lnTo>
+                  <a:close/>
+                </a:path>
+              </a:pathLst>
+            </a:custGeom>
+            <a:solidFill>
+              <a:schemeClr val="accent2">
+                <a:lumMod val="75000"/>
+                <a:alpha val="70000"/>
+              </a:schemeClr>
+            </a:solidFill>
+            <a:ln>
+              <a:noFill/>
+            </a:ln>
+            <a:effectLst/>
+          </p:spPr>
+          <p:style>
+            <a:lnRef idx="1">
+              <a:schemeClr val="accent1"/>
+            </a:lnRef>
+            <a:fillRef idx="3">
+              <a:schemeClr val="accent1"/>
+            </a:fillRef>
+            <a:effectRef idx="2">
+              <a:schemeClr val="accent1"/>
+            </a:effectRef>
+            <a:fontRef idx="minor">
+              <a:schemeClr val="lt1"/>
+            </a:fontRef>
+          </p:style>
+        </p:sp>
+        <p:sp>
+          <p:nvSpPr>
+            <p:cNvPr id="78" name="Rectangle 28">
+              <a:extLst>
+                <a:ext uri="{FF2B5EF4-FFF2-40B4-BE49-F238E27FC236}">
+                  <a16:creationId xmlns:a16="http://schemas.microsoft.com/office/drawing/2014/main" id="{5D4FC972-94B3-4035-8D31-E668C132B411}"/>
+                </a:ext>
+                <a:ext uri="{C183D7F6-B498-43B3-948B-1728B52AA6E4}">
+                  <adec:decorative xmlns:adec="http://schemas.microsoft.com/office/drawing/2017/decorative" val="1"/>
+                </a:ext>
+              </a:extLst>
+            </p:cNvPr>
+            <p:cNvSpPr/>
+            <p:nvPr>
+              <p:extLst>
+                <p:ext uri="{386F3935-93C4-4BCD-93E2-E3B085C9AB24}">
+                  <p16:designElem xmlns:p16="http://schemas.microsoft.com/office/powerpoint/2015/main" val="1"/>
+                </p:ext>
+              </p:extLst>
+            </p:nvPr>
+          </p:nvSpPr>
+          <p:spPr>
+            <a:xfrm>
+              <a:off x="10898730" y="-8467"/>
+              <a:ext cx="1290094" cy="6866467"/>
+            </a:xfrm>
+            <a:custGeom>
+              <a:avLst/>
+              <a:gdLst/>
+              <a:ahLst/>
+              <a:cxnLst/>
+              <a:rect l="l" t="t" r="r" b="b"/>
+              <a:pathLst>
+                <a:path w="1290094" h="6858000">
+                  <a:moveTo>
+                    <a:pt x="1019735" y="0"/>
+                  </a:moveTo>
+                  <a:lnTo>
+                    <a:pt x="1290094" y="0"/>
+                  </a:lnTo>
+                  <a:lnTo>
+                    <a:pt x="1290094" y="6858000"/>
+                  </a:lnTo>
+                  <a:lnTo>
+                    <a:pt x="0" y="6858000"/>
+                  </a:lnTo>
+                  <a:lnTo>
+                    <a:pt x="1019735" y="0"/>
+                  </a:lnTo>
+                  <a:close/>
+                </a:path>
+              </a:pathLst>
+            </a:custGeom>
+            <a:solidFill>
+              <a:schemeClr val="accent1">
+                <a:lumMod val="60000"/>
+                <a:lumOff val="40000"/>
+                <a:alpha val="70000"/>
+              </a:schemeClr>
+            </a:solidFill>
+            <a:ln>
+              <a:noFill/>
+            </a:ln>
+            <a:effectLst/>
+          </p:spPr>
+          <p:style>
+            <a:lnRef idx="1">
+              <a:schemeClr val="accent1"/>
+            </a:lnRef>
+            <a:fillRef idx="3">
+              <a:schemeClr val="accent1"/>
+            </a:fillRef>
+            <a:effectRef idx="2">
+              <a:schemeClr val="accent1"/>
+            </a:effectRef>
+            <a:fontRef idx="minor">
+              <a:schemeClr val="lt1"/>
+            </a:fontRef>
+          </p:style>
+        </p:sp>
+        <p:sp>
+          <p:nvSpPr>
+            <p:cNvPr id="79" name="Rectangle 29">
+              <a:extLst>
+                <a:ext uri="{FF2B5EF4-FFF2-40B4-BE49-F238E27FC236}">
+                  <a16:creationId xmlns:a16="http://schemas.microsoft.com/office/drawing/2014/main" id="{374B9941-AFBE-4A77-A50E-B6EA04A746AE}"/>
+                </a:ext>
+                <a:ext uri="{C183D7F6-B498-43B3-948B-1728B52AA6E4}">
+                  <adec:decorative xmlns:adec="http://schemas.microsoft.com/office/drawing/2017/decorative" val="1"/>
+                </a:ext>
+              </a:extLst>
+            </p:cNvPr>
+            <p:cNvSpPr/>
+            <p:nvPr>
+              <p:extLst>
+                <p:ext uri="{386F3935-93C4-4BCD-93E2-E3B085C9AB24}">
+                  <p16:designElem xmlns:p16="http://schemas.microsoft.com/office/powerpoint/2015/main" val="1"/>
+                </p:ext>
+              </p:extLst>
+            </p:nvPr>
+          </p:nvSpPr>
+          <p:spPr>
+            <a:xfrm>
+              <a:off x="10938999" y="-8467"/>
+              <a:ext cx="1249825" cy="6866467"/>
+            </a:xfrm>
+            <a:custGeom>
+              <a:avLst/>
+              <a:gdLst/>
+              <a:ahLst/>
+              <a:cxnLst/>
+              <a:rect l="l" t="t" r="r" b="b"/>
+              <a:pathLst>
+                <a:path w="1249825" h="6858000">
+                  <a:moveTo>
+                    <a:pt x="0" y="0"/>
+                  </a:moveTo>
+                  <a:lnTo>
+                    <a:pt x="1249825" y="0"/>
+                  </a:lnTo>
+                  <a:lnTo>
+                    <a:pt x="1249825" y="6858000"/>
+                  </a:lnTo>
+                  <a:lnTo>
+                    <a:pt x="1109382" y="6858000"/>
+                  </a:lnTo>
+                  <a:lnTo>
+                    <a:pt x="0" y="0"/>
+                  </a:lnTo>
+                  <a:close/>
+                </a:path>
+              </a:pathLst>
+            </a:custGeom>
+            <a:solidFill>
+              <a:schemeClr val="accent1">
+                <a:alpha val="65000"/>
+              </a:schemeClr>
+            </a:solidFill>
+            <a:ln>
+              <a:noFill/>
+            </a:ln>
+            <a:effectLst/>
+          </p:spPr>
+          <p:style>
+            <a:lnRef idx="1">
+              <a:schemeClr val="accent1"/>
+            </a:lnRef>
+            <a:fillRef idx="3">
+              <a:schemeClr val="accent1"/>
+            </a:fillRef>
+            <a:effectRef idx="2">
+              <a:schemeClr val="accent1"/>
+            </a:effectRef>
+            <a:fontRef idx="minor">
+              <a:schemeClr val="lt1"/>
+            </a:fontRef>
+          </p:style>
+        </p:sp>
+        <p:sp>
+          <p:nvSpPr>
+            <p:cNvPr id="80" name="Isosceles Triangle 79">
+              <a:extLst>
+                <a:ext uri="{FF2B5EF4-FFF2-40B4-BE49-F238E27FC236}">
+                  <a16:creationId xmlns:a16="http://schemas.microsoft.com/office/drawing/2014/main" id="{27A982C5-2C38-4CE9-BC18-94697AD657FB}"/>
+                </a:ext>
+                <a:ext uri="{C183D7F6-B498-43B3-948B-1728B52AA6E4}">
+                  <adec:decorative xmlns:adec="http://schemas.microsoft.com/office/drawing/2017/decorative" val="1"/>
+                </a:ext>
+              </a:extLst>
+            </p:cNvPr>
+            <p:cNvSpPr/>
+            <p:nvPr>
+              <p:extLst>
+                <p:ext uri="{386F3935-93C4-4BCD-93E2-E3B085C9AB24}">
+                  <p16:designElem xmlns:p16="http://schemas.microsoft.com/office/powerpoint/2015/main" val="1"/>
+                </p:ext>
+              </p:extLst>
+            </p:nvPr>
+          </p:nvSpPr>
+          <p:spPr>
+            <a:xfrm>
+              <a:off x="10371666" y="3589867"/>
+              <a:ext cx="1817159" cy="3268133"/>
+            </a:xfrm>
+            <a:prstGeom prst="triangle">
+              <a:avLst>
+                <a:gd name="adj" fmla="val 100000"/>
+              </a:avLst>
+            </a:prstGeom>
+            <a:solidFill>
+              <a:schemeClr val="accent1">
+                <a:alpha val="80000"/>
+              </a:schemeClr>
+            </a:solidFill>
+            <a:ln>
+              <a:noFill/>
+            </a:ln>
+            <a:effectLst/>
+          </p:spPr>
+          <p:style>
+            <a:lnRef idx="1">
+              <a:schemeClr val="accent1"/>
+            </a:lnRef>
+            <a:fillRef idx="3">
+              <a:schemeClr val="accent1"/>
+            </a:fillRef>
+            <a:effectRef idx="2">
+              <a:schemeClr val="accent1"/>
+            </a:effectRef>
+            <a:fontRef idx="minor">
+              <a:schemeClr val="lt1"/>
+            </a:fontRef>
+          </p:style>
+        </p:sp>
+        <p:sp>
+          <p:nvSpPr>
+            <p:cNvPr id="81" name="Isosceles Triangle 80">
+              <a:extLst>
+                <a:ext uri="{FF2B5EF4-FFF2-40B4-BE49-F238E27FC236}">
+                  <a16:creationId xmlns:a16="http://schemas.microsoft.com/office/drawing/2014/main" id="{0060D8D1-7BB1-498F-AFBB-ADAC130A9E90}"/>
+                </a:ext>
+                <a:ext uri="{C183D7F6-B498-43B3-948B-1728B52AA6E4}">
+                  <adec:decorative xmlns:adec="http://schemas.microsoft.com/office/drawing/2017/decorative" val="1"/>
+                </a:ext>
+              </a:extLst>
+            </p:cNvPr>
+            <p:cNvSpPr/>
+            <p:nvPr>
+              <p:extLst>
+                <p:ext uri="{386F3935-93C4-4BCD-93E2-E3B085C9AB24}">
+                  <p16:designElem xmlns:p16="http://schemas.microsoft.com/office/powerpoint/2015/main" val="1"/>
+                </p:ext>
+              </p:extLst>
+            </p:nvPr>
+          </p:nvSpPr>
+          <p:spPr>
+            <a:xfrm rot="10800000">
+              <a:off x="0" y="0"/>
+              <a:ext cx="842596" cy="5666154"/>
+            </a:xfrm>
+            <a:prstGeom prst="triangle">
+              <a:avLst>
+                <a:gd name="adj" fmla="val 100000"/>
+              </a:avLst>
+            </a:prstGeom>
+            <a:solidFill>
+              <a:schemeClr val="accent1">
+                <a:alpha val="85000"/>
+              </a:schemeClr>
+            </a:solidFill>
+            <a:ln>
+              <a:noFill/>
+            </a:ln>
+            <a:effectLst/>
+          </p:spPr>
+          <p:style>
+            <a:lnRef idx="1">
+              <a:schemeClr val="accent1"/>
+            </a:lnRef>
+            <a:fillRef idx="3">
+              <a:schemeClr val="accent1"/>
+            </a:fillRef>
+            <a:effectRef idx="2">
+              <a:schemeClr val="accent1"/>
+            </a:effectRef>
+            <a:fontRef idx="minor">
+              <a:schemeClr val="lt1"/>
+            </a:fontRef>
+          </p:style>
+        </p:sp>
+      </p:grpSp>
       <p:sp>
         <p:nvSpPr>
           <p:cNvPr id="4" name="Title 3">
@@ -13441,25 +14195,96 @@
             <p:ph type="title"/>
           </p:nvPr>
         </p:nvSpPr>
-        <p:spPr/>
+        <p:spPr>
+          <a:xfrm>
+            <a:off x="6094855" y="1261331"/>
+            <a:ext cx="3497565" cy="3002662"/>
+          </a:xfrm>
+        </p:spPr>
         <p:txBody>
-          <a:bodyPr/>
+          <a:bodyPr vert="horz" lIns="91440" tIns="45720" rIns="91440" bIns="45720" rtlCol="0" anchor="b">
+            <a:normAutofit/>
+          </a:bodyPr>
           <a:lstStyle/>
           <a:p>
-            <a:pPr algn="ctr"/>
             <a:r>
-              <a:rPr lang="en-US" dirty="0"/>
+              <a:rPr lang="en-US" sz="4400" kern="1200">
+                <a:solidFill>
+                  <a:schemeClr val="accent1"/>
+                </a:solidFill>
+                <a:latin typeface="+mj-lt"/>
+                <a:ea typeface="+mj-ea"/>
+                <a:cs typeface="+mj-cs"/>
+              </a:rPr>
               <a:t>C02 Emissions Budget</a:t>
             </a:r>
           </a:p>
         </p:txBody>
       </p:sp>
+      <p:sp>
+        <p:nvSpPr>
+          <p:cNvPr id="83" name="Isosceles Triangle 82">
+            <a:extLst>
+              <a:ext uri="{FF2B5EF4-FFF2-40B4-BE49-F238E27FC236}">
+                <a16:creationId xmlns:a16="http://schemas.microsoft.com/office/drawing/2014/main" id="{AA330523-F25B-4007-B3E5-ABB5637D160A}"/>
+              </a:ext>
+              <a:ext uri="{C183D7F6-B498-43B3-948B-1728B52AA6E4}">
+                <adec:decorative xmlns:adec="http://schemas.microsoft.com/office/drawing/2017/decorative" val="1"/>
+              </a:ext>
+            </a:extLst>
+          </p:cNvPr>
+          <p:cNvSpPr>
+            <a:spLocks noGrp="1" noRot="1" noChangeAspect="1" noMove="1" noResize="1" noEditPoints="1" noAdjustHandles="1" noChangeArrowheads="1" noChangeShapeType="1" noTextEdit="1"/>
+          </p:cNvSpPr>
+          <p:nvPr>
+            <p:extLst>
+              <p:ext uri="{386F3935-93C4-4BCD-93E2-E3B085C9AB24}">
+                <p16:designElem xmlns:p16="http://schemas.microsoft.com/office/powerpoint/2015/main" val="1"/>
+              </p:ext>
+            </p:extLst>
+          </p:nvPr>
+        </p:nvSpPr>
+        <p:spPr>
+          <a:xfrm rot="10800000">
+            <a:off x="3174" y="12700"/>
+            <a:ext cx="842596" cy="5666154"/>
+          </a:xfrm>
+          <a:prstGeom prst="triangle">
+            <a:avLst>
+              <a:gd name="adj" fmla="val 100000"/>
+            </a:avLst>
+          </a:prstGeom>
+          <a:solidFill>
+            <a:schemeClr val="accent1">
+              <a:alpha val="85000"/>
+            </a:schemeClr>
+          </a:solidFill>
+          <a:ln>
+            <a:noFill/>
+          </a:ln>
+          <a:effectLst/>
+        </p:spPr>
+        <p:style>
+          <a:lnRef idx="1">
+            <a:schemeClr val="accent1"/>
+          </a:lnRef>
+          <a:fillRef idx="3">
+            <a:schemeClr val="accent1"/>
+          </a:fillRef>
+          <a:effectRef idx="2">
+            <a:schemeClr val="accent1"/>
+          </a:effectRef>
+          <a:fontRef idx="minor">
+            <a:schemeClr val="lt1"/>
+          </a:fontRef>
+        </p:style>
+      </p:sp>
       <p:pic>
         <p:nvPicPr>
-          <p:cNvPr id="6" name="Picture 6">
+          <p:cNvPr id="1026" name="Picture 2">
             <a:extLst>
               <a:ext uri="{FF2B5EF4-FFF2-40B4-BE49-F238E27FC236}">
-                <a16:creationId xmlns:a16="http://schemas.microsoft.com/office/drawing/2014/main" id="{E962FBEF-B659-4C1B-B5E6-162F57A738D9}"/>
+                <a16:creationId xmlns:a16="http://schemas.microsoft.com/office/drawing/2014/main" id="{B1FB2076-2CC0-4304-A0BB-F5EC3B8C9DC4}"/>
               </a:ext>
             </a:extLst>
           </p:cNvPr>
@@ -13476,15 +14301,14 @@
               </a:ext>
             </a:extLst>
           </a:blip>
-          <a:srcRect/>
           <a:stretch>
             <a:fillRect/>
           </a:stretch>
         </p:blipFill>
         <p:spPr bwMode="auto">
           <a:xfrm>
-            <a:off x="2303905" y="2044182"/>
-            <a:ext cx="5343525" cy="4314825"/>
+            <a:off x="888603" y="1522932"/>
+            <a:ext cx="4887354" cy="3812136"/>
           </a:xfrm>
           <a:prstGeom prst="rect">
             <a:avLst/>
@@ -13541,7 +14365,7 @@
       </p:grpSpPr>
       <p:grpSp>
         <p:nvGrpSpPr>
-          <p:cNvPr id="73" name="Group 72">
+          <p:cNvPr id="137" name="Group 136">
             <a:extLst>
               <a:ext uri="{FF2B5EF4-FFF2-40B4-BE49-F238E27FC236}">
                 <a16:creationId xmlns:a16="http://schemas.microsoft.com/office/drawing/2014/main" id="{7664F850-BA8B-47AE-B11A-225CAB8969F1}"/>
@@ -13572,7 +14396,7 @@
         </p:grpSpPr>
         <p:cxnSp>
           <p:nvCxnSpPr>
-            <p:cNvPr id="74" name="Straight Connector 73">
+            <p:cNvPr id="138" name="Straight Connector 137">
               <a:extLst>
                 <a:ext uri="{FF2B5EF4-FFF2-40B4-BE49-F238E27FC236}">
                   <a16:creationId xmlns:a16="http://schemas.microsoft.com/office/drawing/2014/main" id="{634FC909-7343-4DEC-920F-098F56B476F0}"/>
@@ -13624,7 +14448,7 @@
         </p:cxnSp>
         <p:cxnSp>
           <p:nvCxnSpPr>
-            <p:cNvPr id="75" name="Straight Connector 74">
+            <p:cNvPr id="139" name="Straight Connector 138">
               <a:extLst>
                 <a:ext uri="{FF2B5EF4-FFF2-40B4-BE49-F238E27FC236}">
                   <a16:creationId xmlns:a16="http://schemas.microsoft.com/office/drawing/2014/main" id="{24F22DB2-7E27-4CF7-8B17-254ECB9AE771}"/>
@@ -13676,7 +14500,7 @@
         </p:cxnSp>
         <p:sp>
           <p:nvSpPr>
-            <p:cNvPr id="76" name="Rectangle 23">
+            <p:cNvPr id="140" name="Rectangle 23">
               <a:extLst>
                 <a:ext uri="{FF2B5EF4-FFF2-40B4-BE49-F238E27FC236}">
                   <a16:creationId xmlns:a16="http://schemas.microsoft.com/office/drawing/2014/main" id="{C6E593B3-91A3-4687-8B8D-FE37A3714FD2}"/>
@@ -13754,7 +14578,7 @@
         </p:sp>
         <p:sp>
           <p:nvSpPr>
-            <p:cNvPr id="77" name="Rectangle 25">
+            <p:cNvPr id="141" name="Rectangle 25">
               <a:extLst>
                 <a:ext uri="{FF2B5EF4-FFF2-40B4-BE49-F238E27FC236}">
                   <a16:creationId xmlns:a16="http://schemas.microsoft.com/office/drawing/2014/main" id="{0C25B431-5C97-4B8D-B0A3-BFB8133C7173}"/>
@@ -13832,7 +14656,7 @@
         </p:sp>
         <p:sp>
           <p:nvSpPr>
-            <p:cNvPr id="78" name="Isosceles Triangle 77">
+            <p:cNvPr id="142" name="Isosceles Triangle 141">
               <a:extLst>
                 <a:ext uri="{FF2B5EF4-FFF2-40B4-BE49-F238E27FC236}">
                   <a16:creationId xmlns:a16="http://schemas.microsoft.com/office/drawing/2014/main" id="{CA37B366-497E-4CB8-A678-A770CE2BD873}"/>
@@ -13888,7 +14712,7 @@
         </p:sp>
         <p:sp>
           <p:nvSpPr>
-            <p:cNvPr id="79" name="Rectangle 27">
+            <p:cNvPr id="143" name="Rectangle 27">
               <a:extLst>
                 <a:ext uri="{FF2B5EF4-FFF2-40B4-BE49-F238E27FC236}">
                   <a16:creationId xmlns:a16="http://schemas.microsoft.com/office/drawing/2014/main" id="{CF707EDC-52B2-4D5C-8EC3-71C66EE8B3F4}"/>
@@ -13967,7 +14791,7 @@
         </p:sp>
         <p:sp>
           <p:nvSpPr>
-            <p:cNvPr id="80" name="Rectangle 28">
+            <p:cNvPr id="144" name="Rectangle 28">
               <a:extLst>
                 <a:ext uri="{FF2B5EF4-FFF2-40B4-BE49-F238E27FC236}">
                   <a16:creationId xmlns:a16="http://schemas.microsoft.com/office/drawing/2014/main" id="{BF8E2DE7-7466-4EDF-8D69-BCA91A88D360}"/>
@@ -14047,7 +14871,7 @@
         </p:sp>
         <p:sp>
           <p:nvSpPr>
-            <p:cNvPr id="81" name="Rectangle 29">
+            <p:cNvPr id="145" name="Rectangle 29">
               <a:extLst>
                 <a:ext uri="{FF2B5EF4-FFF2-40B4-BE49-F238E27FC236}">
                   <a16:creationId xmlns:a16="http://schemas.microsoft.com/office/drawing/2014/main" id="{229C2E15-76CD-409E-9D6B-10DAD8881EAB}"/>
@@ -14125,7 +14949,7 @@
         </p:sp>
         <p:sp>
           <p:nvSpPr>
-            <p:cNvPr id="82" name="Isosceles Triangle 81">
+            <p:cNvPr id="146" name="Isosceles Triangle 145">
               <a:extLst>
                 <a:ext uri="{FF2B5EF4-FFF2-40B4-BE49-F238E27FC236}">
                   <a16:creationId xmlns:a16="http://schemas.microsoft.com/office/drawing/2014/main" id="{89A24369-AC96-4A98-AD98-47A7217ECCE5}"/>
@@ -14181,7 +15005,7 @@
         </p:sp>
         <p:sp>
           <p:nvSpPr>
-            <p:cNvPr id="83" name="Isosceles Triangle 82">
+            <p:cNvPr id="147" name="Isosceles Triangle 146">
               <a:extLst>
                 <a:ext uri="{FF2B5EF4-FFF2-40B4-BE49-F238E27FC236}">
                   <a16:creationId xmlns:a16="http://schemas.microsoft.com/office/drawing/2014/main" id="{7D0DF9A3-4628-42F6-B0A4-44D97617E0E5}"/>
@@ -14238,7 +15062,7 @@
       </p:grpSp>
       <p:sp>
         <p:nvSpPr>
-          <p:cNvPr id="85" name="Rectangle 84">
+          <p:cNvPr id="149" name="Rectangle 148">
             <a:extLst>
               <a:ext uri="{FF2B5EF4-FFF2-40B4-BE49-F238E27FC236}">
                 <a16:creationId xmlns:a16="http://schemas.microsoft.com/office/drawing/2014/main" id="{7459C506-5F4B-4B75-9218-C7C3F87FA8D3}"/>
@@ -14298,7 +15122,7 @@
       </p:sp>
       <p:grpSp>
         <p:nvGrpSpPr>
-          <p:cNvPr id="87" name="Group 86">
+          <p:cNvPr id="151" name="Group 150">
             <a:extLst>
               <a:ext uri="{FF2B5EF4-FFF2-40B4-BE49-F238E27FC236}">
                 <a16:creationId xmlns:a16="http://schemas.microsoft.com/office/drawing/2014/main" id="{BC659EEB-C3AE-4544-8263-417009DCDF41}"/>
@@ -14329,7 +15153,7 @@
         </p:grpSpPr>
         <p:cxnSp>
           <p:nvCxnSpPr>
-            <p:cNvPr id="88" name="Straight Connector 87">
+            <p:cNvPr id="152" name="Straight Connector 151">
               <a:extLst>
                 <a:ext uri="{FF2B5EF4-FFF2-40B4-BE49-F238E27FC236}">
                   <a16:creationId xmlns:a16="http://schemas.microsoft.com/office/drawing/2014/main" id="{D99DB6C6-36F9-4576-A558-95153EADBE41}"/>
@@ -14381,7 +15205,7 @@
         </p:cxnSp>
         <p:sp>
           <p:nvSpPr>
-            <p:cNvPr id="89" name="Rectangle 23">
+            <p:cNvPr id="153" name="Rectangle 23">
               <a:extLst>
                 <a:ext uri="{FF2B5EF4-FFF2-40B4-BE49-F238E27FC236}">
                   <a16:creationId xmlns:a16="http://schemas.microsoft.com/office/drawing/2014/main" id="{694E7916-EDE4-4B50-A4A1-6B28FDD4D9B9}"/>
@@ -14459,7 +15283,7 @@
         </p:sp>
         <p:sp>
           <p:nvSpPr>
-            <p:cNvPr id="90" name="Rectangle 25">
+            <p:cNvPr id="154" name="Rectangle 25">
               <a:extLst>
                 <a:ext uri="{FF2B5EF4-FFF2-40B4-BE49-F238E27FC236}">
                   <a16:creationId xmlns:a16="http://schemas.microsoft.com/office/drawing/2014/main" id="{6F6CB7BB-4370-4173-97F8-F636C0F149F1}"/>
@@ -14537,7 +15361,7 @@
         </p:sp>
         <p:sp>
           <p:nvSpPr>
-            <p:cNvPr id="91" name="Isosceles Triangle 90">
+            <p:cNvPr id="155" name="Isosceles Triangle 154">
               <a:extLst>
                 <a:ext uri="{FF2B5EF4-FFF2-40B4-BE49-F238E27FC236}">
                   <a16:creationId xmlns:a16="http://schemas.microsoft.com/office/drawing/2014/main" id="{B0F590BB-1F51-4138-A2D4-2E483C84FB07}"/>
@@ -14593,7 +15417,7 @@
         </p:sp>
         <p:sp>
           <p:nvSpPr>
-            <p:cNvPr id="92" name="Rectangle 27">
+            <p:cNvPr id="156" name="Rectangle 27">
               <a:extLst>
                 <a:ext uri="{FF2B5EF4-FFF2-40B4-BE49-F238E27FC236}">
                   <a16:creationId xmlns:a16="http://schemas.microsoft.com/office/drawing/2014/main" id="{4A492863-9797-45A2-BAB3-514F10C5F254}"/>
@@ -14672,7 +15496,7 @@
         </p:sp>
         <p:sp>
           <p:nvSpPr>
-            <p:cNvPr id="93" name="Rectangle 28">
+            <p:cNvPr id="157" name="Rectangle 28">
               <a:extLst>
                 <a:ext uri="{FF2B5EF4-FFF2-40B4-BE49-F238E27FC236}">
                   <a16:creationId xmlns:a16="http://schemas.microsoft.com/office/drawing/2014/main" id="{7C1E33F6-6D0F-4ECF-92F4-6F71D8BAF3D9}"/>
@@ -14752,7 +15576,7 @@
         </p:sp>
         <p:sp>
           <p:nvSpPr>
-            <p:cNvPr id="94" name="Rectangle 29">
+            <p:cNvPr id="158" name="Rectangle 29">
               <a:extLst>
                 <a:ext uri="{FF2B5EF4-FFF2-40B4-BE49-F238E27FC236}">
                   <a16:creationId xmlns:a16="http://schemas.microsoft.com/office/drawing/2014/main" id="{73EEEA64-7411-474B-BD0E-60C24B3F4E56}"/>
@@ -14830,7 +15654,7 @@
         </p:sp>
         <p:sp>
           <p:nvSpPr>
-            <p:cNvPr id="95" name="Isosceles Triangle 94">
+            <p:cNvPr id="159" name="Isosceles Triangle 158">
               <a:extLst>
                 <a:ext uri="{FF2B5EF4-FFF2-40B4-BE49-F238E27FC236}">
                   <a16:creationId xmlns:a16="http://schemas.microsoft.com/office/drawing/2014/main" id="{4F82A6DD-92BB-4443-B5A5-05240DD5580E}"/>
@@ -14886,7 +15710,7 @@
         </p:sp>
         <p:sp>
           <p:nvSpPr>
-            <p:cNvPr id="96" name="Isosceles Triangle 95">
+            <p:cNvPr id="160" name="Isosceles Triangle 159">
               <a:extLst>
                 <a:ext uri="{FF2B5EF4-FFF2-40B4-BE49-F238E27FC236}">
                   <a16:creationId xmlns:a16="http://schemas.microsoft.com/office/drawing/2014/main" id="{79832BCB-1DCF-46AC-9FFA-170791668D8C}"/>
@@ -14943,7 +15767,7 @@
       </p:grpSp>
       <p:sp useBgFill="1">
         <p:nvSpPr>
-          <p:cNvPr id="98" name="Rectangle 97">
+          <p:cNvPr id="162" name="Rectangle 161">
             <a:extLst>
               <a:ext uri="{FF2B5EF4-FFF2-40B4-BE49-F238E27FC236}">
                 <a16:creationId xmlns:a16="http://schemas.microsoft.com/office/drawing/2014/main" id="{4E74DA95-CD7A-4D5E-9D27-67A759CE708D}"/>
@@ -15005,10 +15829,10 @@
       </p:sp>
       <p:pic>
         <p:nvPicPr>
-          <p:cNvPr id="12292" name="Picture 4">
+          <p:cNvPr id="5122" name="Picture 2">
             <a:extLst>
               <a:ext uri="{FF2B5EF4-FFF2-40B4-BE49-F238E27FC236}">
-                <a16:creationId xmlns:a16="http://schemas.microsoft.com/office/drawing/2014/main" id="{85325EFE-A072-402A-8C08-65CC3F469358}"/>
+                <a16:creationId xmlns:a16="http://schemas.microsoft.com/office/drawing/2014/main" id="{C8768DC2-9645-4BB5-965E-1B94523F2E70}"/>
               </a:ext>
             </a:extLst>
           </p:cNvPr>
@@ -15031,8 +15855,8 @@
         </p:blipFill>
         <p:spPr bwMode="auto">
           <a:xfrm>
-            <a:off x="1124262" y="1584857"/>
-            <a:ext cx="4650004" cy="3696753"/>
+            <a:off x="1124262" y="1642982"/>
+            <a:ext cx="4650004" cy="3580503"/>
           </a:xfrm>
           <a:prstGeom prst="rect">
             <a:avLst/>
@@ -15051,7 +15875,7 @@
       </p:pic>
       <p:cxnSp>
         <p:nvCxnSpPr>
-          <p:cNvPr id="100" name="Straight Connector 99">
+          <p:cNvPr id="164" name="Straight Connector 163">
             <a:extLst>
               <a:ext uri="{FF2B5EF4-FFF2-40B4-BE49-F238E27FC236}">
                 <a16:creationId xmlns:a16="http://schemas.microsoft.com/office/drawing/2014/main" id="{14AA3B5C-0C55-4FFF-9C45-8F9F7C074A4E}"/>
@@ -15098,10 +15922,10 @@
       </p:cxnSp>
       <p:pic>
         <p:nvPicPr>
-          <p:cNvPr id="12290" name="Picture 2">
+          <p:cNvPr id="5124" name="Picture 4">
             <a:extLst>
               <a:ext uri="{FF2B5EF4-FFF2-40B4-BE49-F238E27FC236}">
-                <a16:creationId xmlns:a16="http://schemas.microsoft.com/office/drawing/2014/main" id="{C03C156A-76CE-41A0-8ED1-CCFBBF327731}"/>
+                <a16:creationId xmlns:a16="http://schemas.microsoft.com/office/drawing/2014/main" id="{AC9FFB1E-5E1A-43FA-A456-78FCFCFB0CCE}"/>
               </a:ext>
             </a:extLst>
           </p:cNvPr>
@@ -15124,8 +15948,8 @@
         </p:blipFill>
         <p:spPr bwMode="auto">
           <a:xfrm>
-            <a:off x="6414367" y="1584856"/>
-            <a:ext cx="4650004" cy="3696753"/>
+            <a:off x="6414367" y="1642981"/>
+            <a:ext cx="4650004" cy="3580503"/>
           </a:xfrm>
           <a:prstGeom prst="rect">
             <a:avLst/>
@@ -15509,6 +16333,19 @@
             </a:r>
             <a:endParaRPr lang="en-US" dirty="0"/>
           </a:p>
+          <a:p>
+            <a:pPr>
+              <a:buFont typeface="Wingdings" panose="05000000000000000000" pitchFamily="2" charset="2"/>
+              <a:buChar char="q"/>
+            </a:pPr>
+            <a:r>
+              <a:rPr lang="en-US" dirty="0">
+                <a:hlinkClick r:id="rId10"/>
+              </a:rPr>
+              <a:t>Carbon Budget (globalcarbonproject.org)</a:t>
+            </a:r>
+            <a:endParaRPr lang="en-US" dirty="0"/>
+          </a:p>
         </p:txBody>
       </p:sp>
       <p:sp>
@@ -15830,7 +16667,10 @@
           </a:bodyPr>
           <a:lstStyle/>
           <a:p>
-            <a:pPr>
+            <a:pPr marL="285750" indent="-285750">
+              <a:lnSpc>
+                <a:spcPct val="150000"/>
+              </a:lnSpc>
               <a:spcBef>
                 <a:spcPts val="1000"/>
               </a:spcBef>
@@ -15838,11 +16678,11 @@
                 <a:schemeClr val="accent1"/>
               </a:buClr>
               <a:buSzPct val="80000"/>
-              <a:buFont typeface="Wingdings 3" charset="2"/>
-              <a:buChar char=""/>
+              <a:buFont typeface="Wingdings" panose="05000000000000000000" pitchFamily="2" charset="2"/>
+              <a:buChar char="q"/>
             </a:pPr>
             <a:r>
-              <a:rPr lang="en-US" b="1" i="0">
+              <a:rPr lang="en-US" b="1" i="0" dirty="0">
                 <a:solidFill>
                   <a:schemeClr val="tx1">
                     <a:lumMod val="75000"/>
@@ -15851,10 +16691,10 @@
                 </a:solidFill>
                 <a:effectLst/>
               </a:rPr>
-              <a:t>When corals are stressed by changes in conditions such as temperature, light, or nutrients, they expel the</a:t>
+              <a:t> When corals are stressed by changes in conditions such as temperature, light, or nutrients, they expel the</a:t>
             </a:r>
             <a:r>
-              <a:rPr lang="en-US" b="1">
+              <a:rPr lang="en-US" b="1" dirty="0">
                 <a:solidFill>
                   <a:schemeClr val="tx1">
                     <a:lumMod val="75000"/>
@@ -15864,7 +16704,7 @@
               </a:rPr>
               <a:t> symbiotic algae living in their tissues, causing them to turn completely white.</a:t>
             </a:r>
-            <a:endParaRPr lang="en-US" b="1" i="0">
+            <a:endParaRPr lang="en-US" b="1" i="0" dirty="0">
               <a:solidFill>
                 <a:schemeClr val="tx1">
                   <a:lumMod val="75000"/>
@@ -20485,6 +21325,14 @@
 <file path=ppt/slides/slide9.xml><?xml version="1.0" encoding="utf-8"?>
 <p:sld xmlns:a="http://schemas.openxmlformats.org/drawingml/2006/main" xmlns:r="http://schemas.openxmlformats.org/officeDocument/2006/relationships" xmlns:p="http://schemas.openxmlformats.org/presentationml/2006/main">
   <p:cSld>
+    <p:bg>
+      <p:bgPr>
+        <a:solidFill>
+          <a:schemeClr val="bg1"/>
+        </a:solidFill>
+        <a:effectLst/>
+      </p:bgPr>
+    </p:bg>
     <p:spTree>
       <p:nvGrpSpPr>
         <p:cNvPr id="1" name=""/>
@@ -20499,6 +21347,703 @@
           <a:chExt cx="0" cy="0"/>
         </a:xfrm>
       </p:grpSpPr>
+      <p:grpSp>
+        <p:nvGrpSpPr>
+          <p:cNvPr id="71" name="Group 70">
+            <a:extLst>
+              <a:ext uri="{FF2B5EF4-FFF2-40B4-BE49-F238E27FC236}">
+                <a16:creationId xmlns:a16="http://schemas.microsoft.com/office/drawing/2014/main" id="{B4DE830A-B531-4A3B-96F6-0ECE88B08555}"/>
+              </a:ext>
+              <a:ext uri="{C183D7F6-B498-43B3-948B-1728B52AA6E4}">
+                <adec:decorative xmlns:adec="http://schemas.microsoft.com/office/drawing/2017/decorative" val="1"/>
+              </a:ext>
+            </a:extLst>
+          </p:cNvPr>
+          <p:cNvGrpSpPr>
+            <a:grpSpLocks noGrp="1" noUngrp="1" noRot="1" noChangeAspect="1" noMove="1" noResize="1"/>
+          </p:cNvGrpSpPr>
+          <p:nvPr>
+            <p:extLst>
+              <p:ext uri="{386F3935-93C4-4BCD-93E2-E3B085C9AB24}">
+                <p16:designElem xmlns:p16="http://schemas.microsoft.com/office/powerpoint/2015/main" val="1"/>
+              </p:ext>
+            </p:extLst>
+          </p:nvPr>
+        </p:nvGrpSpPr>
+        <p:grpSpPr>
+          <a:xfrm>
+            <a:off x="0" y="-8467"/>
+            <a:ext cx="12192000" cy="6866467"/>
+            <a:chOff x="0" y="-8467"/>
+            <a:chExt cx="12192000" cy="6866467"/>
+          </a:xfrm>
+        </p:grpSpPr>
+        <p:cxnSp>
+          <p:nvCxnSpPr>
+            <p:cNvPr id="72" name="Straight Connector 71">
+              <a:extLst>
+                <a:ext uri="{FF2B5EF4-FFF2-40B4-BE49-F238E27FC236}">
+                  <a16:creationId xmlns:a16="http://schemas.microsoft.com/office/drawing/2014/main" id="{2813DF2C-461A-4A8F-9679-A172790D1F3A}"/>
+                </a:ext>
+                <a:ext uri="{C183D7F6-B498-43B3-948B-1728B52AA6E4}">
+                  <adec:decorative xmlns:adec="http://schemas.microsoft.com/office/drawing/2017/decorative" val="1"/>
+                </a:ext>
+              </a:extLst>
+            </p:cNvPr>
+            <p:cNvCxnSpPr/>
+            <p:nvPr>
+              <p:extLst>
+                <p:ext uri="{386F3935-93C4-4BCD-93E2-E3B085C9AB24}">
+                  <p16:designElem xmlns:p16="http://schemas.microsoft.com/office/powerpoint/2015/main" val="1"/>
+                </p:ext>
+              </p:extLst>
+            </p:nvPr>
+          </p:nvCxnSpPr>
+          <p:spPr>
+            <a:xfrm>
+              <a:off x="9371012" y="0"/>
+              <a:ext cx="1219200" cy="6858000"/>
+            </a:xfrm>
+            <a:prstGeom prst="line">
+              <a:avLst/>
+            </a:prstGeom>
+            <a:ln w="9525">
+              <a:solidFill>
+                <a:schemeClr val="bg1">
+                  <a:lumMod val="75000"/>
+                </a:schemeClr>
+              </a:solidFill>
+            </a:ln>
+          </p:spPr>
+          <p:style>
+            <a:lnRef idx="2">
+              <a:schemeClr val="accent1"/>
+            </a:lnRef>
+            <a:fillRef idx="0">
+              <a:schemeClr val="accent1"/>
+            </a:fillRef>
+            <a:effectRef idx="1">
+              <a:schemeClr val="accent1"/>
+            </a:effectRef>
+            <a:fontRef idx="minor">
+              <a:schemeClr val="tx1"/>
+            </a:fontRef>
+          </p:style>
+        </p:cxnSp>
+        <p:cxnSp>
+          <p:nvCxnSpPr>
+            <p:cNvPr id="73" name="Straight Connector 72">
+              <a:extLst>
+                <a:ext uri="{FF2B5EF4-FFF2-40B4-BE49-F238E27FC236}">
+                  <a16:creationId xmlns:a16="http://schemas.microsoft.com/office/drawing/2014/main" id="{54CD3A85-C039-4249-86E4-1EB9318B5495}"/>
+                </a:ext>
+                <a:ext uri="{C183D7F6-B498-43B3-948B-1728B52AA6E4}">
+                  <adec:decorative xmlns:adec="http://schemas.microsoft.com/office/drawing/2017/decorative" val="1"/>
+                </a:ext>
+              </a:extLst>
+            </p:cNvPr>
+            <p:cNvCxnSpPr/>
+            <p:nvPr>
+              <p:extLst>
+                <p:ext uri="{386F3935-93C4-4BCD-93E2-E3B085C9AB24}">
+                  <p16:designElem xmlns:p16="http://schemas.microsoft.com/office/powerpoint/2015/main" val="1"/>
+                </p:ext>
+              </p:extLst>
+            </p:nvPr>
+          </p:nvCxnSpPr>
+          <p:spPr>
+            <a:xfrm flipH="1">
+              <a:off x="7425267" y="3681413"/>
+              <a:ext cx="4763558" cy="3176587"/>
+            </a:xfrm>
+            <a:prstGeom prst="line">
+              <a:avLst/>
+            </a:prstGeom>
+            <a:ln w="9525">
+              <a:solidFill>
+                <a:schemeClr val="bg1">
+                  <a:lumMod val="85000"/>
+                </a:schemeClr>
+              </a:solidFill>
+            </a:ln>
+          </p:spPr>
+          <p:style>
+            <a:lnRef idx="2">
+              <a:schemeClr val="accent1"/>
+            </a:lnRef>
+            <a:fillRef idx="0">
+              <a:schemeClr val="accent1"/>
+            </a:fillRef>
+            <a:effectRef idx="1">
+              <a:schemeClr val="accent1"/>
+            </a:effectRef>
+            <a:fontRef idx="minor">
+              <a:schemeClr val="tx1"/>
+            </a:fontRef>
+          </p:style>
+        </p:cxnSp>
+        <p:sp>
+          <p:nvSpPr>
+            <p:cNvPr id="74" name="Rectangle 23">
+              <a:extLst>
+                <a:ext uri="{FF2B5EF4-FFF2-40B4-BE49-F238E27FC236}">
+                  <a16:creationId xmlns:a16="http://schemas.microsoft.com/office/drawing/2014/main" id="{887EA6D2-2883-42C2-993D-094CA6D65DA3}"/>
+                </a:ext>
+                <a:ext uri="{C183D7F6-B498-43B3-948B-1728B52AA6E4}">
+                  <adec:decorative xmlns:adec="http://schemas.microsoft.com/office/drawing/2017/decorative" val="1"/>
+                </a:ext>
+              </a:extLst>
+            </p:cNvPr>
+            <p:cNvSpPr/>
+            <p:nvPr>
+              <p:extLst>
+                <p:ext uri="{386F3935-93C4-4BCD-93E2-E3B085C9AB24}">
+                  <p16:designElem xmlns:p16="http://schemas.microsoft.com/office/powerpoint/2015/main" val="1"/>
+                </p:ext>
+              </p:extLst>
+            </p:nvPr>
+          </p:nvSpPr>
+          <p:spPr>
+            <a:xfrm>
+              <a:off x="9181476" y="-8467"/>
+              <a:ext cx="3007349" cy="6866467"/>
+            </a:xfrm>
+            <a:custGeom>
+              <a:avLst/>
+              <a:gdLst/>
+              <a:ahLst/>
+              <a:cxnLst/>
+              <a:rect l="l" t="t" r="r" b="b"/>
+              <a:pathLst>
+                <a:path w="3007349" h="6866467">
+                  <a:moveTo>
+                    <a:pt x="2045532" y="0"/>
+                  </a:moveTo>
+                  <a:lnTo>
+                    <a:pt x="3007349" y="0"/>
+                  </a:lnTo>
+                  <a:lnTo>
+                    <a:pt x="3007349" y="6866467"/>
+                  </a:lnTo>
+                  <a:lnTo>
+                    <a:pt x="0" y="6866467"/>
+                  </a:lnTo>
+                  <a:lnTo>
+                    <a:pt x="2045532" y="0"/>
+                  </a:lnTo>
+                  <a:close/>
+                </a:path>
+              </a:pathLst>
+            </a:custGeom>
+            <a:solidFill>
+              <a:schemeClr val="accent1">
+                <a:alpha val="30000"/>
+              </a:schemeClr>
+            </a:solidFill>
+            <a:ln>
+              <a:noFill/>
+            </a:ln>
+            <a:effectLst/>
+          </p:spPr>
+          <p:style>
+            <a:lnRef idx="1">
+              <a:schemeClr val="accent1"/>
+            </a:lnRef>
+            <a:fillRef idx="3">
+              <a:schemeClr val="accent1"/>
+            </a:fillRef>
+            <a:effectRef idx="2">
+              <a:schemeClr val="accent1"/>
+            </a:effectRef>
+            <a:fontRef idx="minor">
+              <a:schemeClr val="lt1"/>
+            </a:fontRef>
+          </p:style>
+        </p:sp>
+        <p:sp>
+          <p:nvSpPr>
+            <p:cNvPr id="75" name="Rectangle 25">
+              <a:extLst>
+                <a:ext uri="{FF2B5EF4-FFF2-40B4-BE49-F238E27FC236}">
+                  <a16:creationId xmlns:a16="http://schemas.microsoft.com/office/drawing/2014/main" id="{3B895046-636F-4D1B-ACA4-29AA0CB3329F}"/>
+                </a:ext>
+                <a:ext uri="{C183D7F6-B498-43B3-948B-1728B52AA6E4}">
+                  <adec:decorative xmlns:adec="http://schemas.microsoft.com/office/drawing/2017/decorative" val="1"/>
+                </a:ext>
+              </a:extLst>
+            </p:cNvPr>
+            <p:cNvSpPr/>
+            <p:nvPr>
+              <p:extLst>
+                <p:ext uri="{386F3935-93C4-4BCD-93E2-E3B085C9AB24}">
+                  <p16:designElem xmlns:p16="http://schemas.microsoft.com/office/powerpoint/2015/main" val="1"/>
+                </p:ext>
+              </p:extLst>
+            </p:nvPr>
+          </p:nvSpPr>
+          <p:spPr>
+            <a:xfrm>
+              <a:off x="9603442" y="-8467"/>
+              <a:ext cx="2588558" cy="6866467"/>
+            </a:xfrm>
+            <a:custGeom>
+              <a:avLst/>
+              <a:gdLst/>
+              <a:ahLst/>
+              <a:cxnLst/>
+              <a:rect l="l" t="t" r="r" b="b"/>
+              <a:pathLst>
+                <a:path w="2573311" h="6866467">
+                  <a:moveTo>
+                    <a:pt x="0" y="0"/>
+                  </a:moveTo>
+                  <a:lnTo>
+                    <a:pt x="2573311" y="0"/>
+                  </a:lnTo>
+                  <a:lnTo>
+                    <a:pt x="2573311" y="6866467"/>
+                  </a:lnTo>
+                  <a:lnTo>
+                    <a:pt x="1202336" y="6866467"/>
+                  </a:lnTo>
+                  <a:lnTo>
+                    <a:pt x="0" y="0"/>
+                  </a:lnTo>
+                  <a:close/>
+                </a:path>
+              </a:pathLst>
+            </a:custGeom>
+            <a:solidFill>
+              <a:schemeClr val="accent1">
+                <a:alpha val="20000"/>
+              </a:schemeClr>
+            </a:solidFill>
+            <a:ln>
+              <a:noFill/>
+            </a:ln>
+            <a:effectLst/>
+          </p:spPr>
+          <p:style>
+            <a:lnRef idx="1">
+              <a:schemeClr val="accent1"/>
+            </a:lnRef>
+            <a:fillRef idx="3">
+              <a:schemeClr val="accent1"/>
+            </a:fillRef>
+            <a:effectRef idx="2">
+              <a:schemeClr val="accent1"/>
+            </a:effectRef>
+            <a:fontRef idx="minor">
+              <a:schemeClr val="lt1"/>
+            </a:fontRef>
+          </p:style>
+        </p:sp>
+        <p:sp>
+          <p:nvSpPr>
+            <p:cNvPr id="76" name="Isosceles Triangle 75">
+              <a:extLst>
+                <a:ext uri="{FF2B5EF4-FFF2-40B4-BE49-F238E27FC236}">
+                  <a16:creationId xmlns:a16="http://schemas.microsoft.com/office/drawing/2014/main" id="{C6B0CDE3-E054-4EDD-A43B-F96843D8BF51}"/>
+                </a:ext>
+                <a:ext uri="{C183D7F6-B498-43B3-948B-1728B52AA6E4}">
+                  <adec:decorative xmlns:adec="http://schemas.microsoft.com/office/drawing/2017/decorative" val="1"/>
+                </a:ext>
+              </a:extLst>
+            </p:cNvPr>
+            <p:cNvSpPr/>
+            <p:nvPr>
+              <p:extLst>
+                <p:ext uri="{386F3935-93C4-4BCD-93E2-E3B085C9AB24}">
+                  <p16:designElem xmlns:p16="http://schemas.microsoft.com/office/powerpoint/2015/main" val="1"/>
+                </p:ext>
+              </p:extLst>
+            </p:nvPr>
+          </p:nvSpPr>
+          <p:spPr>
+            <a:xfrm>
+              <a:off x="8932333" y="3048000"/>
+              <a:ext cx="3259667" cy="3810000"/>
+            </a:xfrm>
+            <a:prstGeom prst="triangle">
+              <a:avLst>
+                <a:gd name="adj" fmla="val 100000"/>
+              </a:avLst>
+            </a:prstGeom>
+            <a:solidFill>
+              <a:schemeClr val="accent2">
+                <a:alpha val="72000"/>
+              </a:schemeClr>
+            </a:solidFill>
+            <a:ln>
+              <a:noFill/>
+            </a:ln>
+            <a:effectLst/>
+          </p:spPr>
+          <p:style>
+            <a:lnRef idx="1">
+              <a:schemeClr val="accent1"/>
+            </a:lnRef>
+            <a:fillRef idx="3">
+              <a:schemeClr val="accent1"/>
+            </a:fillRef>
+            <a:effectRef idx="2">
+              <a:schemeClr val="accent1"/>
+            </a:effectRef>
+            <a:fontRef idx="minor">
+              <a:schemeClr val="lt1"/>
+            </a:fontRef>
+          </p:style>
+        </p:sp>
+        <p:sp>
+          <p:nvSpPr>
+            <p:cNvPr id="77" name="Rectangle 27">
+              <a:extLst>
+                <a:ext uri="{FF2B5EF4-FFF2-40B4-BE49-F238E27FC236}">
+                  <a16:creationId xmlns:a16="http://schemas.microsoft.com/office/drawing/2014/main" id="{3B66B1A2-F145-4C9B-85CC-4BF30D58CBC5}"/>
+                </a:ext>
+                <a:ext uri="{C183D7F6-B498-43B3-948B-1728B52AA6E4}">
+                  <adec:decorative xmlns:adec="http://schemas.microsoft.com/office/drawing/2017/decorative" val="1"/>
+                </a:ext>
+              </a:extLst>
+            </p:cNvPr>
+            <p:cNvSpPr/>
+            <p:nvPr>
+              <p:extLst>
+                <p:ext uri="{386F3935-93C4-4BCD-93E2-E3B085C9AB24}">
+                  <p16:designElem xmlns:p16="http://schemas.microsoft.com/office/powerpoint/2015/main" val="1"/>
+                </p:ext>
+              </p:extLst>
+            </p:nvPr>
+          </p:nvSpPr>
+          <p:spPr>
+            <a:xfrm>
+              <a:off x="9334500" y="-8467"/>
+              <a:ext cx="2854326" cy="6866467"/>
+            </a:xfrm>
+            <a:custGeom>
+              <a:avLst/>
+              <a:gdLst/>
+              <a:ahLst/>
+              <a:cxnLst/>
+              <a:rect l="l" t="t" r="r" b="b"/>
+              <a:pathLst>
+                <a:path w="2858013" h="6866467">
+                  <a:moveTo>
+                    <a:pt x="0" y="0"/>
+                  </a:moveTo>
+                  <a:lnTo>
+                    <a:pt x="2858013" y="0"/>
+                  </a:lnTo>
+                  <a:lnTo>
+                    <a:pt x="2858013" y="6866467"/>
+                  </a:lnTo>
+                  <a:lnTo>
+                    <a:pt x="2473942" y="6866467"/>
+                  </a:lnTo>
+                  <a:lnTo>
+                    <a:pt x="0" y="0"/>
+                  </a:lnTo>
+                  <a:close/>
+                </a:path>
+              </a:pathLst>
+            </a:custGeom>
+            <a:solidFill>
+              <a:schemeClr val="accent2">
+                <a:lumMod val="75000"/>
+                <a:alpha val="70000"/>
+              </a:schemeClr>
+            </a:solidFill>
+            <a:ln>
+              <a:noFill/>
+            </a:ln>
+            <a:effectLst/>
+          </p:spPr>
+          <p:style>
+            <a:lnRef idx="1">
+              <a:schemeClr val="accent1"/>
+            </a:lnRef>
+            <a:fillRef idx="3">
+              <a:schemeClr val="accent1"/>
+            </a:fillRef>
+            <a:effectRef idx="2">
+              <a:schemeClr val="accent1"/>
+            </a:effectRef>
+            <a:fontRef idx="minor">
+              <a:schemeClr val="lt1"/>
+            </a:fontRef>
+          </p:style>
+        </p:sp>
+        <p:sp>
+          <p:nvSpPr>
+            <p:cNvPr id="78" name="Rectangle 28">
+              <a:extLst>
+                <a:ext uri="{FF2B5EF4-FFF2-40B4-BE49-F238E27FC236}">
+                  <a16:creationId xmlns:a16="http://schemas.microsoft.com/office/drawing/2014/main" id="{5D4FC972-94B3-4035-8D31-E668C132B411}"/>
+                </a:ext>
+                <a:ext uri="{C183D7F6-B498-43B3-948B-1728B52AA6E4}">
+                  <adec:decorative xmlns:adec="http://schemas.microsoft.com/office/drawing/2017/decorative" val="1"/>
+                </a:ext>
+              </a:extLst>
+            </p:cNvPr>
+            <p:cNvSpPr/>
+            <p:nvPr>
+              <p:extLst>
+                <p:ext uri="{386F3935-93C4-4BCD-93E2-E3B085C9AB24}">
+                  <p16:designElem xmlns:p16="http://schemas.microsoft.com/office/powerpoint/2015/main" val="1"/>
+                </p:ext>
+              </p:extLst>
+            </p:nvPr>
+          </p:nvSpPr>
+          <p:spPr>
+            <a:xfrm>
+              <a:off x="10898730" y="-8467"/>
+              <a:ext cx="1290094" cy="6866467"/>
+            </a:xfrm>
+            <a:custGeom>
+              <a:avLst/>
+              <a:gdLst/>
+              <a:ahLst/>
+              <a:cxnLst/>
+              <a:rect l="l" t="t" r="r" b="b"/>
+              <a:pathLst>
+                <a:path w="1290094" h="6858000">
+                  <a:moveTo>
+                    <a:pt x="1019735" y="0"/>
+                  </a:moveTo>
+                  <a:lnTo>
+                    <a:pt x="1290094" y="0"/>
+                  </a:lnTo>
+                  <a:lnTo>
+                    <a:pt x="1290094" y="6858000"/>
+                  </a:lnTo>
+                  <a:lnTo>
+                    <a:pt x="0" y="6858000"/>
+                  </a:lnTo>
+                  <a:lnTo>
+                    <a:pt x="1019735" y="0"/>
+                  </a:lnTo>
+                  <a:close/>
+                </a:path>
+              </a:pathLst>
+            </a:custGeom>
+            <a:solidFill>
+              <a:schemeClr val="accent1">
+                <a:lumMod val="60000"/>
+                <a:lumOff val="40000"/>
+                <a:alpha val="70000"/>
+              </a:schemeClr>
+            </a:solidFill>
+            <a:ln>
+              <a:noFill/>
+            </a:ln>
+            <a:effectLst/>
+          </p:spPr>
+          <p:style>
+            <a:lnRef idx="1">
+              <a:schemeClr val="accent1"/>
+            </a:lnRef>
+            <a:fillRef idx="3">
+              <a:schemeClr val="accent1"/>
+            </a:fillRef>
+            <a:effectRef idx="2">
+              <a:schemeClr val="accent1"/>
+            </a:effectRef>
+            <a:fontRef idx="minor">
+              <a:schemeClr val="lt1"/>
+            </a:fontRef>
+          </p:style>
+        </p:sp>
+        <p:sp>
+          <p:nvSpPr>
+            <p:cNvPr id="79" name="Rectangle 29">
+              <a:extLst>
+                <a:ext uri="{FF2B5EF4-FFF2-40B4-BE49-F238E27FC236}">
+                  <a16:creationId xmlns:a16="http://schemas.microsoft.com/office/drawing/2014/main" id="{374B9941-AFBE-4A77-A50E-B6EA04A746AE}"/>
+                </a:ext>
+                <a:ext uri="{C183D7F6-B498-43B3-948B-1728B52AA6E4}">
+                  <adec:decorative xmlns:adec="http://schemas.microsoft.com/office/drawing/2017/decorative" val="1"/>
+                </a:ext>
+              </a:extLst>
+            </p:cNvPr>
+            <p:cNvSpPr/>
+            <p:nvPr>
+              <p:extLst>
+                <p:ext uri="{386F3935-93C4-4BCD-93E2-E3B085C9AB24}">
+                  <p16:designElem xmlns:p16="http://schemas.microsoft.com/office/powerpoint/2015/main" val="1"/>
+                </p:ext>
+              </p:extLst>
+            </p:nvPr>
+          </p:nvSpPr>
+          <p:spPr>
+            <a:xfrm>
+              <a:off x="10938999" y="-8467"/>
+              <a:ext cx="1249825" cy="6866467"/>
+            </a:xfrm>
+            <a:custGeom>
+              <a:avLst/>
+              <a:gdLst/>
+              <a:ahLst/>
+              <a:cxnLst/>
+              <a:rect l="l" t="t" r="r" b="b"/>
+              <a:pathLst>
+                <a:path w="1249825" h="6858000">
+                  <a:moveTo>
+                    <a:pt x="0" y="0"/>
+                  </a:moveTo>
+                  <a:lnTo>
+                    <a:pt x="1249825" y="0"/>
+                  </a:lnTo>
+                  <a:lnTo>
+                    <a:pt x="1249825" y="6858000"/>
+                  </a:lnTo>
+                  <a:lnTo>
+                    <a:pt x="1109382" y="6858000"/>
+                  </a:lnTo>
+                  <a:lnTo>
+                    <a:pt x="0" y="0"/>
+                  </a:lnTo>
+                  <a:close/>
+                </a:path>
+              </a:pathLst>
+            </a:custGeom>
+            <a:solidFill>
+              <a:schemeClr val="accent1">
+                <a:alpha val="65000"/>
+              </a:schemeClr>
+            </a:solidFill>
+            <a:ln>
+              <a:noFill/>
+            </a:ln>
+            <a:effectLst/>
+          </p:spPr>
+          <p:style>
+            <a:lnRef idx="1">
+              <a:schemeClr val="accent1"/>
+            </a:lnRef>
+            <a:fillRef idx="3">
+              <a:schemeClr val="accent1"/>
+            </a:fillRef>
+            <a:effectRef idx="2">
+              <a:schemeClr val="accent1"/>
+            </a:effectRef>
+            <a:fontRef idx="minor">
+              <a:schemeClr val="lt1"/>
+            </a:fontRef>
+          </p:style>
+        </p:sp>
+        <p:sp>
+          <p:nvSpPr>
+            <p:cNvPr id="80" name="Isosceles Triangle 79">
+              <a:extLst>
+                <a:ext uri="{FF2B5EF4-FFF2-40B4-BE49-F238E27FC236}">
+                  <a16:creationId xmlns:a16="http://schemas.microsoft.com/office/drawing/2014/main" id="{27A982C5-2C38-4CE9-BC18-94697AD657FB}"/>
+                </a:ext>
+                <a:ext uri="{C183D7F6-B498-43B3-948B-1728B52AA6E4}">
+                  <adec:decorative xmlns:adec="http://schemas.microsoft.com/office/drawing/2017/decorative" val="1"/>
+                </a:ext>
+              </a:extLst>
+            </p:cNvPr>
+            <p:cNvSpPr/>
+            <p:nvPr>
+              <p:extLst>
+                <p:ext uri="{386F3935-93C4-4BCD-93E2-E3B085C9AB24}">
+                  <p16:designElem xmlns:p16="http://schemas.microsoft.com/office/powerpoint/2015/main" val="1"/>
+                </p:ext>
+              </p:extLst>
+            </p:nvPr>
+          </p:nvSpPr>
+          <p:spPr>
+            <a:xfrm>
+              <a:off x="10371666" y="3589867"/>
+              <a:ext cx="1817159" cy="3268133"/>
+            </a:xfrm>
+            <a:prstGeom prst="triangle">
+              <a:avLst>
+                <a:gd name="adj" fmla="val 100000"/>
+              </a:avLst>
+            </a:prstGeom>
+            <a:solidFill>
+              <a:schemeClr val="accent1">
+                <a:alpha val="80000"/>
+              </a:schemeClr>
+            </a:solidFill>
+            <a:ln>
+              <a:noFill/>
+            </a:ln>
+            <a:effectLst/>
+          </p:spPr>
+          <p:style>
+            <a:lnRef idx="1">
+              <a:schemeClr val="accent1"/>
+            </a:lnRef>
+            <a:fillRef idx="3">
+              <a:schemeClr val="accent1"/>
+            </a:fillRef>
+            <a:effectRef idx="2">
+              <a:schemeClr val="accent1"/>
+            </a:effectRef>
+            <a:fontRef idx="minor">
+              <a:schemeClr val="lt1"/>
+            </a:fontRef>
+          </p:style>
+        </p:sp>
+        <p:sp>
+          <p:nvSpPr>
+            <p:cNvPr id="81" name="Isosceles Triangle 80">
+              <a:extLst>
+                <a:ext uri="{FF2B5EF4-FFF2-40B4-BE49-F238E27FC236}">
+                  <a16:creationId xmlns:a16="http://schemas.microsoft.com/office/drawing/2014/main" id="{0060D8D1-7BB1-498F-AFBB-ADAC130A9E90}"/>
+                </a:ext>
+                <a:ext uri="{C183D7F6-B498-43B3-948B-1728B52AA6E4}">
+                  <adec:decorative xmlns:adec="http://schemas.microsoft.com/office/drawing/2017/decorative" val="1"/>
+                </a:ext>
+              </a:extLst>
+            </p:cNvPr>
+            <p:cNvSpPr/>
+            <p:nvPr>
+              <p:extLst>
+                <p:ext uri="{386F3935-93C4-4BCD-93E2-E3B085C9AB24}">
+                  <p16:designElem xmlns:p16="http://schemas.microsoft.com/office/powerpoint/2015/main" val="1"/>
+                </p:ext>
+              </p:extLst>
+            </p:nvPr>
+          </p:nvSpPr>
+          <p:spPr>
+            <a:xfrm rot="10800000">
+              <a:off x="0" y="0"/>
+              <a:ext cx="842596" cy="5666154"/>
+            </a:xfrm>
+            <a:prstGeom prst="triangle">
+              <a:avLst>
+                <a:gd name="adj" fmla="val 100000"/>
+              </a:avLst>
+            </a:prstGeom>
+            <a:solidFill>
+              <a:schemeClr val="accent1">
+                <a:alpha val="85000"/>
+              </a:schemeClr>
+            </a:solidFill>
+            <a:ln>
+              <a:noFill/>
+            </a:ln>
+            <a:effectLst/>
+          </p:spPr>
+          <p:style>
+            <a:lnRef idx="1">
+              <a:schemeClr val="accent1"/>
+            </a:lnRef>
+            <a:fillRef idx="3">
+              <a:schemeClr val="accent1"/>
+            </a:fillRef>
+            <a:effectRef idx="2">
+              <a:schemeClr val="accent1"/>
+            </a:effectRef>
+            <a:fontRef idx="minor">
+              <a:schemeClr val="lt1"/>
+            </a:fontRef>
+          </p:style>
+        </p:sp>
+      </p:grpSp>
       <p:sp>
         <p:nvSpPr>
           <p:cNvPr id="2" name="Title 1">
@@ -20515,25 +22060,96 @@
             <p:ph type="title"/>
           </p:nvPr>
         </p:nvSpPr>
-        <p:spPr/>
+        <p:spPr>
+          <a:xfrm>
+            <a:off x="6094855" y="1261331"/>
+            <a:ext cx="3497565" cy="3002662"/>
+          </a:xfrm>
+        </p:spPr>
         <p:txBody>
-          <a:bodyPr/>
+          <a:bodyPr vert="horz" lIns="91440" tIns="45720" rIns="91440" bIns="45720" rtlCol="0" anchor="b">
+            <a:normAutofit/>
+          </a:bodyPr>
           <a:lstStyle/>
           <a:p>
-            <a:pPr algn="ctr"/>
             <a:r>
-              <a:rPr lang="en-US" dirty="0"/>
+              <a:rPr lang="en-US" sz="4100" kern="1200">
+                <a:solidFill>
+                  <a:schemeClr val="accent1"/>
+                </a:solidFill>
+                <a:latin typeface="+mj-lt"/>
+                <a:ea typeface="+mj-ea"/>
+                <a:cs typeface="+mj-cs"/>
+              </a:rPr>
               <a:t>Changing Water Temperatures</a:t>
             </a:r>
           </a:p>
         </p:txBody>
       </p:sp>
+      <p:sp>
+        <p:nvSpPr>
+          <p:cNvPr id="83" name="Isosceles Triangle 82">
+            <a:extLst>
+              <a:ext uri="{FF2B5EF4-FFF2-40B4-BE49-F238E27FC236}">
+                <a16:creationId xmlns:a16="http://schemas.microsoft.com/office/drawing/2014/main" id="{AA330523-F25B-4007-B3E5-ABB5637D160A}"/>
+              </a:ext>
+              <a:ext uri="{C183D7F6-B498-43B3-948B-1728B52AA6E4}">
+                <adec:decorative xmlns:adec="http://schemas.microsoft.com/office/drawing/2017/decorative" val="1"/>
+              </a:ext>
+            </a:extLst>
+          </p:cNvPr>
+          <p:cNvSpPr>
+            <a:spLocks noGrp="1" noRot="1" noChangeAspect="1" noMove="1" noResize="1" noEditPoints="1" noAdjustHandles="1" noChangeArrowheads="1" noChangeShapeType="1" noTextEdit="1"/>
+          </p:cNvSpPr>
+          <p:nvPr>
+            <p:extLst>
+              <p:ext uri="{386F3935-93C4-4BCD-93E2-E3B085C9AB24}">
+                <p16:designElem xmlns:p16="http://schemas.microsoft.com/office/powerpoint/2015/main" val="1"/>
+              </p:ext>
+            </p:extLst>
+          </p:nvPr>
+        </p:nvSpPr>
+        <p:spPr>
+          <a:xfrm rot="10800000">
+            <a:off x="3174" y="12700"/>
+            <a:ext cx="842596" cy="5666154"/>
+          </a:xfrm>
+          <a:prstGeom prst="triangle">
+            <a:avLst>
+              <a:gd name="adj" fmla="val 100000"/>
+            </a:avLst>
+          </a:prstGeom>
+          <a:solidFill>
+            <a:schemeClr val="accent1">
+              <a:alpha val="85000"/>
+            </a:schemeClr>
+          </a:solidFill>
+          <a:ln>
+            <a:noFill/>
+          </a:ln>
+          <a:effectLst/>
+        </p:spPr>
+        <p:style>
+          <a:lnRef idx="1">
+            <a:schemeClr val="accent1"/>
+          </a:lnRef>
+          <a:fillRef idx="3">
+            <a:schemeClr val="accent1"/>
+          </a:fillRef>
+          <a:effectRef idx="2">
+            <a:schemeClr val="accent1"/>
+          </a:effectRef>
+          <a:fontRef idx="minor">
+            <a:schemeClr val="lt1"/>
+          </a:fontRef>
+        </p:style>
+      </p:sp>
       <p:pic>
         <p:nvPicPr>
-          <p:cNvPr id="6146" name="Picture 2">
+          <p:cNvPr id="4098" name="Picture 2">
             <a:extLst>
               <a:ext uri="{FF2B5EF4-FFF2-40B4-BE49-F238E27FC236}">
-                <a16:creationId xmlns:a16="http://schemas.microsoft.com/office/drawing/2014/main" id="{A9F43EA9-3198-447C-A3C7-427813D7C15B}"/>
+                <a16:creationId xmlns:a16="http://schemas.microsoft.com/office/drawing/2014/main" id="{9E6C2B74-A574-4544-B9F9-2CE4D3DE2495}"/>
               </a:ext>
             </a:extLst>
           </p:cNvPr>
@@ -20550,15 +22166,14 @@
               </a:ext>
             </a:extLst>
           </a:blip>
-          <a:srcRect/>
           <a:stretch>
             <a:fillRect/>
           </a:stretch>
         </p:blipFill>
         <p:spPr bwMode="auto">
           <a:xfrm>
-            <a:off x="1007307" y="1536912"/>
-            <a:ext cx="6279739" cy="5201286"/>
+            <a:off x="888603" y="1474058"/>
+            <a:ext cx="4887354" cy="3909883"/>
           </a:xfrm>
           <a:prstGeom prst="rect">
             <a:avLst/>

</xml_diff>

<commit_message>
updated and final pp pres
</commit_message>
<xml_diff>
--- a/data2/capstone_presentation.pptx
+++ b/data2/capstone_presentation.pptx
@@ -16226,7 +16226,7 @@
         </p:spPr>
         <p:txBody>
           <a:bodyPr anchor="ctr">
-            <a:normAutofit/>
+            <a:normAutofit lnSpcReduction="10000"/>
           </a:bodyPr>
           <a:lstStyle/>
           <a:p>
@@ -16343,6 +16343,19 @@
                 <a:hlinkClick r:id="rId10"/>
               </a:rPr>
               <a:t>Carbon Budget (globalcarbonproject.org)</a:t>
+            </a:r>
+            <a:endParaRPr lang="en-US" dirty="0"/>
+          </a:p>
+          <a:p>
+            <a:pPr>
+              <a:buFont typeface="Wingdings" panose="05000000000000000000" pitchFamily="2" charset="2"/>
+              <a:buChar char="q"/>
+            </a:pPr>
+            <a:r>
+              <a:rPr lang="en-US">
+                <a:hlinkClick r:id="rId11"/>
+              </a:rPr>
+              <a:t>Coral Bleaching - Great Barrier Reef Foundation</a:t>
             </a:r>
             <a:endParaRPr lang="en-US" dirty="0"/>
           </a:p>

</xml_diff>